<commit_message>
Clarifying documentation on knowledge capability profiles.
</commit_message>
<xml_diff>
--- a/docs/common-diagrams.pptx
+++ b/docs/common-diagrams.pptx
@@ -5,7 +5,7 @@
     <p:sldMasterId id="2147483648" r:id="rId1"/>
   </p:sldMasterIdLst>
   <p:notesMasterIdLst>
-    <p:notesMasterId r:id="rId10"/>
+    <p:notesMasterId r:id="rId11"/>
   </p:notesMasterIdLst>
   <p:sldIdLst>
     <p:sldId id="256" r:id="rId2"/>
@@ -16,6 +16,7 @@
     <p:sldId id="273" r:id="rId7"/>
     <p:sldId id="260" r:id="rId8"/>
     <p:sldId id="290" r:id="rId9"/>
+    <p:sldId id="257" r:id="rId10"/>
   </p:sldIdLst>
   <p:sldSz cx="12192000" cy="6858000"/>
   <p:notesSz cx="6858000" cy="9144000"/>
@@ -204,7 +205,7 @@
           <a:p>
             <a:fld id="{63A792C6-19D6-4898-A08B-8B00BFA92E14}" type="datetimeFigureOut">
               <a:rPr lang="en-US" smtClean="0"/>
-              <a:t>7/7/2019</a:t>
+              <a:t>10/25/2020</a:t>
             </a:fld>
             <a:endParaRPr lang="en-US"/>
           </a:p>
@@ -1092,7 +1093,7 @@
           <a:p>
             <a:fld id="{79FDAF07-B94C-4635-9A45-26FF98CE243A}" type="datetimeFigureOut">
               <a:rPr lang="en-US" smtClean="0"/>
-              <a:t>7/7/2019</a:t>
+              <a:t>10/25/2020</a:t>
             </a:fld>
             <a:endParaRPr lang="en-US"/>
           </a:p>
@@ -1290,7 +1291,7 @@
           <a:p>
             <a:fld id="{79FDAF07-B94C-4635-9A45-26FF98CE243A}" type="datetimeFigureOut">
               <a:rPr lang="en-US" smtClean="0"/>
-              <a:t>7/7/2019</a:t>
+              <a:t>10/25/2020</a:t>
             </a:fld>
             <a:endParaRPr lang="en-US"/>
           </a:p>
@@ -1498,7 +1499,7 @@
           <a:p>
             <a:fld id="{79FDAF07-B94C-4635-9A45-26FF98CE243A}" type="datetimeFigureOut">
               <a:rPr lang="en-US" smtClean="0"/>
-              <a:t>7/7/2019</a:t>
+              <a:t>10/25/2020</a:t>
             </a:fld>
             <a:endParaRPr lang="en-US"/>
           </a:p>
@@ -2816,7 +2817,7 @@
           <a:p>
             <a:fld id="{79FDAF07-B94C-4635-9A45-26FF98CE243A}" type="datetimeFigureOut">
               <a:rPr lang="en-US" smtClean="0"/>
-              <a:t>7/7/2019</a:t>
+              <a:t>10/25/2020</a:t>
             </a:fld>
             <a:endParaRPr lang="en-US"/>
           </a:p>
@@ -3091,7 +3092,7 @@
           <a:p>
             <a:fld id="{79FDAF07-B94C-4635-9A45-26FF98CE243A}" type="datetimeFigureOut">
               <a:rPr lang="en-US" smtClean="0"/>
-              <a:t>7/7/2019</a:t>
+              <a:t>10/25/2020</a:t>
             </a:fld>
             <a:endParaRPr lang="en-US"/>
           </a:p>
@@ -3356,7 +3357,7 @@
           <a:p>
             <a:fld id="{79FDAF07-B94C-4635-9A45-26FF98CE243A}" type="datetimeFigureOut">
               <a:rPr lang="en-US" smtClean="0"/>
-              <a:t>7/7/2019</a:t>
+              <a:t>10/25/2020</a:t>
             </a:fld>
             <a:endParaRPr lang="en-US"/>
           </a:p>
@@ -3768,7 +3769,7 @@
           <a:p>
             <a:fld id="{79FDAF07-B94C-4635-9A45-26FF98CE243A}" type="datetimeFigureOut">
               <a:rPr lang="en-US" smtClean="0"/>
-              <a:t>7/7/2019</a:t>
+              <a:t>10/25/2020</a:t>
             </a:fld>
             <a:endParaRPr lang="en-US"/>
           </a:p>
@@ -3909,7 +3910,7 @@
           <a:p>
             <a:fld id="{79FDAF07-B94C-4635-9A45-26FF98CE243A}" type="datetimeFigureOut">
               <a:rPr lang="en-US" smtClean="0"/>
-              <a:t>7/7/2019</a:t>
+              <a:t>10/25/2020</a:t>
             </a:fld>
             <a:endParaRPr lang="en-US"/>
           </a:p>
@@ -4022,7 +4023,7 @@
           <a:p>
             <a:fld id="{79FDAF07-B94C-4635-9A45-26FF98CE243A}" type="datetimeFigureOut">
               <a:rPr lang="en-US" smtClean="0"/>
-              <a:t>7/7/2019</a:t>
+              <a:t>10/25/2020</a:t>
             </a:fld>
             <a:endParaRPr lang="en-US"/>
           </a:p>
@@ -4333,7 +4334,7 @@
           <a:p>
             <a:fld id="{79FDAF07-B94C-4635-9A45-26FF98CE243A}" type="datetimeFigureOut">
               <a:rPr lang="en-US" smtClean="0"/>
-              <a:t>7/7/2019</a:t>
+              <a:t>10/25/2020</a:t>
             </a:fld>
             <a:endParaRPr lang="en-US"/>
           </a:p>
@@ -4621,7 +4622,7 @@
           <a:p>
             <a:fld id="{79FDAF07-B94C-4635-9A45-26FF98CE243A}" type="datetimeFigureOut">
               <a:rPr lang="en-US" smtClean="0"/>
-              <a:t>7/7/2019</a:t>
+              <a:t>10/25/2020</a:t>
             </a:fld>
             <a:endParaRPr lang="en-US"/>
           </a:p>
@@ -4862,7 +4863,7 @@
           <a:p>
             <a:fld id="{79FDAF07-B94C-4635-9A45-26FF98CE243A}" type="datetimeFigureOut">
               <a:rPr lang="en-US" smtClean="0"/>
-              <a:t>7/7/2019</a:t>
+              <a:t>10/25/2020</a:t>
             </a:fld>
             <a:endParaRPr lang="en-US"/>
           </a:p>
@@ -14925,6 +14926,464 @@
 </p:sld>
 </file>
 
+<file path=ppt/slides/slide9.xml><?xml version="1.0" encoding="utf-8"?>
+<p:sld xmlns:a="http://schemas.openxmlformats.org/drawingml/2006/main" xmlns:r="http://schemas.openxmlformats.org/officeDocument/2006/relationships" xmlns:p="http://schemas.openxmlformats.org/presentationml/2006/main">
+  <p:cSld>
+    <p:spTree>
+      <p:nvGrpSpPr>
+        <p:cNvPr id="1" name=""/>
+        <p:cNvGrpSpPr/>
+        <p:nvPr/>
+      </p:nvGrpSpPr>
+      <p:grpSpPr>
+        <a:xfrm>
+          <a:off x="0" y="0"/>
+          <a:ext cx="0" cy="0"/>
+          <a:chOff x="0" y="0"/>
+          <a:chExt cx="0" cy="0"/>
+        </a:xfrm>
+      </p:grpSpPr>
+      <p:sp>
+        <p:nvSpPr>
+          <p:cNvPr id="2" name="Oval 1">
+            <a:extLst>
+              <a:ext uri="{FF2B5EF4-FFF2-40B4-BE49-F238E27FC236}">
+                <a16:creationId xmlns:a16="http://schemas.microsoft.com/office/drawing/2014/main" id="{EDFE045F-0C01-42E7-A85C-A533F5D477C3}"/>
+              </a:ext>
+            </a:extLst>
+          </p:cNvPr>
+          <p:cNvSpPr/>
+          <p:nvPr/>
+        </p:nvSpPr>
+        <p:spPr>
+          <a:xfrm>
+            <a:off x="3747752" y="1390918"/>
+            <a:ext cx="1828800" cy="721217"/>
+          </a:xfrm>
+          <a:prstGeom prst="ellipse">
+            <a:avLst/>
+          </a:prstGeom>
+        </p:spPr>
+        <p:style>
+          <a:lnRef idx="2">
+            <a:schemeClr val="accent1">
+              <a:shade val="50000"/>
+            </a:schemeClr>
+          </a:lnRef>
+          <a:fillRef idx="1">
+            <a:schemeClr val="accent1"/>
+          </a:fillRef>
+          <a:effectRef idx="0">
+            <a:schemeClr val="accent1"/>
+          </a:effectRef>
+          <a:fontRef idx="minor">
+            <a:schemeClr val="lt1"/>
+          </a:fontRef>
+        </p:style>
+        <p:txBody>
+          <a:bodyPr rtlCol="0" anchor="ctr"/>
+          <a:lstStyle/>
+          <a:p>
+            <a:pPr algn="ctr"/>
+            <a:r>
+              <a:rPr lang="en-US" b="1" dirty="0"/>
+              <a:t>Shareable</a:t>
+            </a:r>
+          </a:p>
+        </p:txBody>
+      </p:sp>
+      <p:sp>
+        <p:nvSpPr>
+          <p:cNvPr id="5" name="Oval 4">
+            <a:extLst>
+              <a:ext uri="{FF2B5EF4-FFF2-40B4-BE49-F238E27FC236}">
+                <a16:creationId xmlns:a16="http://schemas.microsoft.com/office/drawing/2014/main" id="{046A9111-5EED-482C-B42C-24038FB06C97}"/>
+              </a:ext>
+            </a:extLst>
+          </p:cNvPr>
+          <p:cNvSpPr/>
+          <p:nvPr/>
+        </p:nvSpPr>
+        <p:spPr>
+          <a:xfrm>
+            <a:off x="1609858" y="2554307"/>
+            <a:ext cx="1944710" cy="721217"/>
+          </a:xfrm>
+          <a:prstGeom prst="ellipse">
+            <a:avLst/>
+          </a:prstGeom>
+        </p:spPr>
+        <p:style>
+          <a:lnRef idx="2">
+            <a:schemeClr val="accent1">
+              <a:shade val="50000"/>
+            </a:schemeClr>
+          </a:lnRef>
+          <a:fillRef idx="1">
+            <a:schemeClr val="accent1"/>
+          </a:fillRef>
+          <a:effectRef idx="0">
+            <a:schemeClr val="accent1"/>
+          </a:effectRef>
+          <a:fontRef idx="minor">
+            <a:schemeClr val="lt1"/>
+          </a:fontRef>
+        </p:style>
+        <p:txBody>
+          <a:bodyPr rtlCol="0" anchor="ctr"/>
+          <a:lstStyle/>
+          <a:p>
+            <a:pPr algn="ctr"/>
+            <a:r>
+              <a:rPr lang="en-US" b="1" dirty="0"/>
+              <a:t>Computable</a:t>
+            </a:r>
+          </a:p>
+        </p:txBody>
+      </p:sp>
+      <p:sp>
+        <p:nvSpPr>
+          <p:cNvPr id="7" name="Oval 6">
+            <a:extLst>
+              <a:ext uri="{FF2B5EF4-FFF2-40B4-BE49-F238E27FC236}">
+                <a16:creationId xmlns:a16="http://schemas.microsoft.com/office/drawing/2014/main" id="{3F8FAE9B-1DEE-4C28-B959-8AB979898D8D}"/>
+              </a:ext>
+            </a:extLst>
+          </p:cNvPr>
+          <p:cNvSpPr/>
+          <p:nvPr/>
+        </p:nvSpPr>
+        <p:spPr>
+          <a:xfrm>
+            <a:off x="3747752" y="2554307"/>
+            <a:ext cx="1828800" cy="721217"/>
+          </a:xfrm>
+          <a:prstGeom prst="ellipse">
+            <a:avLst/>
+          </a:prstGeom>
+        </p:spPr>
+        <p:style>
+          <a:lnRef idx="2">
+            <a:schemeClr val="accent1">
+              <a:shade val="50000"/>
+            </a:schemeClr>
+          </a:lnRef>
+          <a:fillRef idx="1">
+            <a:schemeClr val="accent1"/>
+          </a:fillRef>
+          <a:effectRef idx="0">
+            <a:schemeClr val="accent1"/>
+          </a:effectRef>
+          <a:fontRef idx="minor">
+            <a:schemeClr val="lt1"/>
+          </a:fontRef>
+        </p:style>
+        <p:txBody>
+          <a:bodyPr rtlCol="0" anchor="ctr"/>
+          <a:lstStyle/>
+          <a:p>
+            <a:pPr algn="ctr"/>
+            <a:r>
+              <a:rPr lang="en-US" b="1" dirty="0"/>
+              <a:t>Publishable</a:t>
+            </a:r>
+          </a:p>
+        </p:txBody>
+      </p:sp>
+      <p:sp>
+        <p:nvSpPr>
+          <p:cNvPr id="9" name="Oval 8">
+            <a:extLst>
+              <a:ext uri="{FF2B5EF4-FFF2-40B4-BE49-F238E27FC236}">
+                <a16:creationId xmlns:a16="http://schemas.microsoft.com/office/drawing/2014/main" id="{4DF5EE67-9F92-4ED4-8B50-92F8610FC682}"/>
+              </a:ext>
+            </a:extLst>
+          </p:cNvPr>
+          <p:cNvSpPr/>
+          <p:nvPr/>
+        </p:nvSpPr>
+        <p:spPr>
+          <a:xfrm>
+            <a:off x="5769736" y="2554306"/>
+            <a:ext cx="1828800" cy="721217"/>
+          </a:xfrm>
+          <a:prstGeom prst="ellipse">
+            <a:avLst/>
+          </a:prstGeom>
+        </p:spPr>
+        <p:style>
+          <a:lnRef idx="2">
+            <a:schemeClr val="accent1">
+              <a:shade val="50000"/>
+            </a:schemeClr>
+          </a:lnRef>
+          <a:fillRef idx="1">
+            <a:schemeClr val="accent1"/>
+          </a:fillRef>
+          <a:effectRef idx="0">
+            <a:schemeClr val="accent1"/>
+          </a:effectRef>
+          <a:fontRef idx="minor">
+            <a:schemeClr val="lt1"/>
+          </a:fontRef>
+        </p:style>
+        <p:txBody>
+          <a:bodyPr rtlCol="0" anchor="ctr"/>
+          <a:lstStyle/>
+          <a:p>
+            <a:pPr algn="ctr"/>
+            <a:r>
+              <a:rPr lang="en-US" b="1" dirty="0"/>
+              <a:t>Executable</a:t>
+            </a:r>
+          </a:p>
+        </p:txBody>
+      </p:sp>
+      <p:cxnSp>
+        <p:nvCxnSpPr>
+          <p:cNvPr id="11" name="Straight Arrow Connector 10">
+            <a:extLst>
+              <a:ext uri="{FF2B5EF4-FFF2-40B4-BE49-F238E27FC236}">
+                <a16:creationId xmlns:a16="http://schemas.microsoft.com/office/drawing/2014/main" id="{1132473E-877B-4F62-AA08-D995395227A9}"/>
+              </a:ext>
+            </a:extLst>
+          </p:cNvPr>
+          <p:cNvCxnSpPr>
+            <a:cxnSpLocks/>
+          </p:cNvCxnSpPr>
+          <p:nvPr/>
+        </p:nvCxnSpPr>
+        <p:spPr>
+          <a:xfrm flipV="1">
+            <a:off x="2582213" y="2114280"/>
+            <a:ext cx="2079939" cy="442172"/>
+          </a:xfrm>
+          <a:prstGeom prst="straightConnector1">
+            <a:avLst/>
+          </a:prstGeom>
+          <a:ln w="76200">
+            <a:tailEnd type="triangle"/>
+          </a:ln>
+        </p:spPr>
+        <p:style>
+          <a:lnRef idx="3">
+            <a:schemeClr val="accent1"/>
+          </a:lnRef>
+          <a:fillRef idx="0">
+            <a:schemeClr val="accent1"/>
+          </a:fillRef>
+          <a:effectRef idx="2">
+            <a:schemeClr val="accent1"/>
+          </a:effectRef>
+          <a:fontRef idx="minor">
+            <a:schemeClr val="tx1"/>
+          </a:fontRef>
+        </p:style>
+      </p:cxnSp>
+      <p:cxnSp>
+        <p:nvCxnSpPr>
+          <p:cNvPr id="14" name="Straight Arrow Connector 13">
+            <a:extLst>
+              <a:ext uri="{FF2B5EF4-FFF2-40B4-BE49-F238E27FC236}">
+                <a16:creationId xmlns:a16="http://schemas.microsoft.com/office/drawing/2014/main" id="{B5FC58A0-4BB8-43C6-A5E9-49148849697F}"/>
+              </a:ext>
+            </a:extLst>
+          </p:cNvPr>
+          <p:cNvCxnSpPr>
+            <a:cxnSpLocks/>
+            <a:stCxn id="7" idx="0"/>
+            <a:endCxn id="2" idx="4"/>
+          </p:cNvCxnSpPr>
+          <p:nvPr/>
+        </p:nvCxnSpPr>
+        <p:spPr>
+          <a:xfrm flipV="1">
+            <a:off x="4662152" y="2112135"/>
+            <a:ext cx="0" cy="442172"/>
+          </a:xfrm>
+          <a:prstGeom prst="straightConnector1">
+            <a:avLst/>
+          </a:prstGeom>
+          <a:ln w="76200">
+            <a:tailEnd type="triangle"/>
+          </a:ln>
+        </p:spPr>
+        <p:style>
+          <a:lnRef idx="3">
+            <a:schemeClr val="accent1"/>
+          </a:lnRef>
+          <a:fillRef idx="0">
+            <a:schemeClr val="accent1"/>
+          </a:fillRef>
+          <a:effectRef idx="2">
+            <a:schemeClr val="accent1"/>
+          </a:effectRef>
+          <a:fontRef idx="minor">
+            <a:schemeClr val="tx1"/>
+          </a:fontRef>
+        </p:style>
+      </p:cxnSp>
+      <p:cxnSp>
+        <p:nvCxnSpPr>
+          <p:cNvPr id="17" name="Straight Arrow Connector 16">
+            <a:extLst>
+              <a:ext uri="{FF2B5EF4-FFF2-40B4-BE49-F238E27FC236}">
+                <a16:creationId xmlns:a16="http://schemas.microsoft.com/office/drawing/2014/main" id="{8AA502DD-79CF-471A-8723-A07AF6EBF816}"/>
+              </a:ext>
+            </a:extLst>
+          </p:cNvPr>
+          <p:cNvCxnSpPr>
+            <a:cxnSpLocks/>
+            <a:stCxn id="9" idx="0"/>
+            <a:endCxn id="2" idx="4"/>
+          </p:cNvCxnSpPr>
+          <p:nvPr/>
+        </p:nvCxnSpPr>
+        <p:spPr>
+          <a:xfrm flipH="1" flipV="1">
+            <a:off x="4662152" y="2112135"/>
+            <a:ext cx="2021984" cy="442171"/>
+          </a:xfrm>
+          <a:prstGeom prst="straightConnector1">
+            <a:avLst/>
+          </a:prstGeom>
+          <a:ln w="76200">
+            <a:tailEnd type="triangle"/>
+          </a:ln>
+        </p:spPr>
+        <p:style>
+          <a:lnRef idx="3">
+            <a:schemeClr val="accent1"/>
+          </a:lnRef>
+          <a:fillRef idx="0">
+            <a:schemeClr val="accent1"/>
+          </a:fillRef>
+          <a:effectRef idx="2">
+            <a:schemeClr val="accent1"/>
+          </a:effectRef>
+          <a:fontRef idx="minor">
+            <a:schemeClr val="tx1"/>
+          </a:fontRef>
+        </p:style>
+      </p:cxnSp>
+      <p:sp>
+        <p:nvSpPr>
+          <p:cNvPr id="20" name="TextBox 19">
+            <a:extLst>
+              <a:ext uri="{FF2B5EF4-FFF2-40B4-BE49-F238E27FC236}">
+                <a16:creationId xmlns:a16="http://schemas.microsoft.com/office/drawing/2014/main" id="{AB060674-598F-47D6-B102-9532B6AE65DF}"/>
+              </a:ext>
+            </a:extLst>
+          </p:cNvPr>
+          <p:cNvSpPr txBox="1"/>
+          <p:nvPr/>
+        </p:nvSpPr>
+        <p:spPr>
+          <a:xfrm>
+            <a:off x="1745086" y="3431150"/>
+            <a:ext cx="1674253" cy="261610"/>
+          </a:xfrm>
+          <a:prstGeom prst="rect">
+            <a:avLst/>
+          </a:prstGeom>
+          <a:noFill/>
+        </p:spPr>
+        <p:txBody>
+          <a:bodyPr wrap="square" rtlCol="0">
+            <a:spAutoFit/>
+          </a:bodyPr>
+          <a:lstStyle/>
+          <a:p>
+            <a:r>
+              <a:rPr lang="en-US" sz="1100" dirty="0"/>
+              <a:t>Design-time/ authoring</a:t>
+            </a:r>
+          </a:p>
+        </p:txBody>
+      </p:sp>
+      <p:sp>
+        <p:nvSpPr>
+          <p:cNvPr id="22" name="TextBox 21">
+            <a:extLst>
+              <a:ext uri="{FF2B5EF4-FFF2-40B4-BE49-F238E27FC236}">
+                <a16:creationId xmlns:a16="http://schemas.microsoft.com/office/drawing/2014/main" id="{51F01DEA-C3A0-4365-AEAF-60172C189F84}"/>
+              </a:ext>
+            </a:extLst>
+          </p:cNvPr>
+          <p:cNvSpPr txBox="1"/>
+          <p:nvPr/>
+        </p:nvSpPr>
+        <p:spPr>
+          <a:xfrm>
+            <a:off x="3825025" y="3459058"/>
+            <a:ext cx="1674253" cy="261610"/>
+          </a:xfrm>
+          <a:prstGeom prst="rect">
+            <a:avLst/>
+          </a:prstGeom>
+          <a:noFill/>
+        </p:spPr>
+        <p:txBody>
+          <a:bodyPr wrap="square" rtlCol="0">
+            <a:spAutoFit/>
+          </a:bodyPr>
+          <a:lstStyle/>
+          <a:p>
+            <a:r>
+              <a:rPr lang="en-US" sz="1100" dirty="0"/>
+              <a:t>Publishing/distribution</a:t>
+            </a:r>
+          </a:p>
+        </p:txBody>
+      </p:sp>
+      <p:sp>
+        <p:nvSpPr>
+          <p:cNvPr id="3" name="TextBox 2">
+            <a:extLst>
+              <a:ext uri="{FF2B5EF4-FFF2-40B4-BE49-F238E27FC236}">
+                <a16:creationId xmlns:a16="http://schemas.microsoft.com/office/drawing/2014/main" id="{E917289A-FDA6-4463-B7D3-EF4896560232}"/>
+              </a:ext>
+            </a:extLst>
+          </p:cNvPr>
+          <p:cNvSpPr txBox="1"/>
+          <p:nvPr/>
+        </p:nvSpPr>
+        <p:spPr>
+          <a:xfrm>
+            <a:off x="5904964" y="3459058"/>
+            <a:ext cx="1674253" cy="261610"/>
+          </a:xfrm>
+          <a:prstGeom prst="rect">
+            <a:avLst/>
+          </a:prstGeom>
+          <a:noFill/>
+        </p:spPr>
+        <p:txBody>
+          <a:bodyPr wrap="square" rtlCol="0">
+            <a:spAutoFit/>
+          </a:bodyPr>
+          <a:lstStyle/>
+          <a:p>
+            <a:r>
+              <a:rPr lang="en-US" sz="1100" dirty="0"/>
+              <a:t>Runtime/implementation</a:t>
+            </a:r>
+          </a:p>
+        </p:txBody>
+      </p:sp>
+    </p:spTree>
+    <p:extLst>
+      <p:ext uri="{BB962C8B-B14F-4D97-AF65-F5344CB8AC3E}">
+        <p14:creationId xmlns:p14="http://schemas.microsoft.com/office/powerpoint/2010/main" val="2445286905"/>
+      </p:ext>
+    </p:extLst>
+  </p:cSld>
+  <p:clrMapOvr>
+    <a:masterClrMapping/>
+  </p:clrMapOvr>
+</p:sld>
+</file>
+
 <file path=ppt/theme/theme1.xml><?xml version="1.0" encoding="utf-8"?>
 <a:theme xmlns:a="http://schemas.openxmlformats.org/drawingml/2006/main" name="Office Theme">
   <a:themeElements>

</xml_diff>

<commit_message>
Added cpg-answerValueSetSource extension to track value set of inline answer options in a questionnaire.
</commit_message>
<xml_diff>
--- a/docs/common-diagrams.pptx
+++ b/docs/common-diagrams.pptx
@@ -5,7 +5,7 @@
     <p:sldMasterId id="2147483648" r:id="rId1"/>
   </p:sldMasterIdLst>
   <p:notesMasterIdLst>
-    <p:notesMasterId r:id="rId13"/>
+    <p:notesMasterId r:id="rId14"/>
   </p:notesMasterIdLst>
   <p:sldIdLst>
     <p:sldId id="256" r:id="rId2"/>
@@ -15,10 +15,11 @@
     <p:sldId id="306" r:id="rId6"/>
     <p:sldId id="314" r:id="rId7"/>
     <p:sldId id="315" r:id="rId8"/>
-    <p:sldId id="273" r:id="rId9"/>
-    <p:sldId id="260" r:id="rId10"/>
-    <p:sldId id="290" r:id="rId11"/>
-    <p:sldId id="257" r:id="rId12"/>
+    <p:sldId id="3784" r:id="rId9"/>
+    <p:sldId id="273" r:id="rId10"/>
+    <p:sldId id="260" r:id="rId11"/>
+    <p:sldId id="290" r:id="rId12"/>
+    <p:sldId id="257" r:id="rId13"/>
   </p:sldIdLst>
   <p:sldSz cx="12192000" cy="6858000"/>
   <p:notesSz cx="6858000" cy="9144000"/>
@@ -1125,6 +1126,119 @@
     <p:extLst>
       <p:ext uri="{BB962C8B-B14F-4D97-AF65-F5344CB8AC3E}">
         <p14:creationId xmlns:p14="http://schemas.microsoft.com/office/powerpoint/2010/main" val="681598954"/>
+      </p:ext>
+    </p:extLst>
+  </p:cSld>
+  <p:clrMapOvr>
+    <a:masterClrMapping/>
+  </p:clrMapOvr>
+</p:notes>
+</file>
+
+<file path=ppt/notesSlides/notesSlide7.xml><?xml version="1.0" encoding="utf-8"?>
+<p:notes xmlns:a="http://schemas.openxmlformats.org/drawingml/2006/main" xmlns:r="http://schemas.openxmlformats.org/officeDocument/2006/relationships" xmlns:p="http://schemas.openxmlformats.org/presentationml/2006/main">
+  <p:cSld>
+    <p:spTree>
+      <p:nvGrpSpPr>
+        <p:cNvPr id="1" name=""/>
+        <p:cNvGrpSpPr/>
+        <p:nvPr/>
+      </p:nvGrpSpPr>
+      <p:grpSpPr>
+        <a:xfrm>
+          <a:off x="0" y="0"/>
+          <a:ext cx="0" cy="0"/>
+          <a:chOff x="0" y="0"/>
+          <a:chExt cx="0" cy="0"/>
+        </a:xfrm>
+      </p:grpSpPr>
+      <p:sp>
+        <p:nvSpPr>
+          <p:cNvPr id="2" name="Slide Image Placeholder 1"/>
+          <p:cNvSpPr>
+            <a:spLocks noGrp="1" noRot="1" noChangeAspect="1"/>
+          </p:cNvSpPr>
+          <p:nvPr>
+            <p:ph type="sldImg"/>
+          </p:nvPr>
+        </p:nvSpPr>
+        <p:spPr/>
+      </p:sp>
+      <p:sp>
+        <p:nvSpPr>
+          <p:cNvPr id="3" name="Notes Placeholder 2"/>
+          <p:cNvSpPr>
+            <a:spLocks noGrp="1"/>
+          </p:cNvSpPr>
+          <p:nvPr>
+            <p:ph type="body" idx="1"/>
+          </p:nvPr>
+        </p:nvSpPr>
+        <p:spPr/>
+        <p:txBody>
+          <a:bodyPr/>
+          <a:lstStyle/>
+          <a:p>
+            <a:r>
+              <a:rPr lang="en-US" dirty="0"/>
+              <a:t>L1 – Narrative content, so paper forms, guidelines, dictionaries, and other supportive documentation</a:t>
+            </a:r>
+          </a:p>
+          <a:p>
+            <a:r>
+              <a:rPr lang="en-US" dirty="0"/>
+              <a:t>L2 – Semi-structured, so personas, use cases, flow diagrams, decision trees, data dictionaries, and indicator descriptions</a:t>
+            </a:r>
+          </a:p>
+          <a:p>
+            <a:r>
+              <a:rPr lang="en-US" dirty="0"/>
+              <a:t>L3 – Structured, so Questionnaire, Library, </a:t>
+            </a:r>
+            <a:r>
+              <a:rPr lang="en-US" dirty="0" err="1"/>
+              <a:t>ActivityDefinition</a:t>
+            </a:r>
+            <a:r>
+              <a:rPr lang="en-US" dirty="0"/>
+              <a:t>, PlanDefinition, terminology resources, CQL logic, Measure</a:t>
+            </a:r>
+          </a:p>
+          <a:p>
+            <a:r>
+              <a:rPr lang="en-US" dirty="0"/>
+              <a:t>L4 – Running systems</a:t>
+            </a:r>
+          </a:p>
+        </p:txBody>
+      </p:sp>
+      <p:sp>
+        <p:nvSpPr>
+          <p:cNvPr id="4" name="Slide Number Placeholder 3"/>
+          <p:cNvSpPr>
+            <a:spLocks noGrp="1"/>
+          </p:cNvSpPr>
+          <p:nvPr>
+            <p:ph type="sldNum" sz="quarter" idx="5"/>
+          </p:nvPr>
+        </p:nvSpPr>
+        <p:spPr/>
+        <p:txBody>
+          <a:bodyPr/>
+          <a:lstStyle/>
+          <a:p>
+            <a:fld id="{A69C946F-C9B2-9B49-8DCA-D38D97C43A2F}" type="slidenum">
+              <a:rPr lang="en-US" smtClean="0"/>
+              <a:t>8</a:t>
+            </a:fld>
+            <a:endParaRPr lang="en-US"/>
+          </a:p>
+        </p:txBody>
+      </p:sp>
+    </p:spTree>
+    <p:extLst>
+      <p:ext uri="{BB962C8B-B14F-4D97-AF65-F5344CB8AC3E}">
+        <p14:creationId xmlns:p14="http://schemas.microsoft.com/office/powerpoint/2010/main" val="2326575754"/>
       </p:ext>
     </p:extLst>
   </p:cSld>
@@ -5550,6 +5664,580 @@
           <a:chExt cx="0" cy="0"/>
         </a:xfrm>
       </p:grpSpPr>
+      <p:sp>
+        <p:nvSpPr>
+          <p:cNvPr id="26" name="Title 25"/>
+          <p:cNvSpPr>
+            <a:spLocks noGrp="1"/>
+          </p:cNvSpPr>
+          <p:nvPr>
+            <p:ph type="title"/>
+          </p:nvPr>
+        </p:nvSpPr>
+        <p:spPr/>
+        <p:txBody>
+          <a:bodyPr/>
+          <a:lstStyle/>
+          <a:p>
+            <a:r>
+              <a:rPr lang="en-CA" dirty="0"/>
+              <a:t>Common Processes</a:t>
+            </a:r>
+          </a:p>
+        </p:txBody>
+      </p:sp>
+      <p:sp>
+        <p:nvSpPr>
+          <p:cNvPr id="2" name="Slide Number Placeholder 1"/>
+          <p:cNvSpPr>
+            <a:spLocks noGrp="1"/>
+          </p:cNvSpPr>
+          <p:nvPr>
+            <p:ph type="sldNum" sz="quarter" idx="4294967295"/>
+          </p:nvPr>
+        </p:nvSpPr>
+        <p:spPr>
+          <a:xfrm>
+            <a:off x="8077200" y="6356351"/>
+            <a:ext cx="2133600" cy="365125"/>
+          </a:xfrm>
+          <a:prstGeom prst="rect">
+            <a:avLst/>
+          </a:prstGeom>
+        </p:spPr>
+        <p:txBody>
+          <a:bodyPr/>
+          <a:lstStyle/>
+          <a:p>
+            <a:fld id="{6734F48E-A456-4E2F-B17E-509464F7A050}" type="slidenum">
+              <a:rPr lang="en-CA" smtClean="0"/>
+              <a:pPr/>
+              <a:t>10</a:t>
+            </a:fld>
+            <a:endParaRPr lang="en-CA"/>
+          </a:p>
+        </p:txBody>
+      </p:sp>
+      <p:pic>
+        <p:nvPicPr>
+          <p:cNvPr id="20" name="Picture 5"/>
+          <p:cNvPicPr>
+            <a:picLocks noChangeAspect="1" noChangeArrowheads="1"/>
+          </p:cNvPicPr>
+          <p:nvPr/>
+        </p:nvPicPr>
+        <p:blipFill>
+          <a:blip r:embed="rId2" cstate="print"/>
+          <a:srcRect/>
+          <a:stretch>
+            <a:fillRect/>
+          </a:stretch>
+        </p:blipFill>
+        <p:spPr bwMode="auto">
+          <a:xfrm>
+            <a:off x="4876800" y="1471056"/>
+            <a:ext cx="1034886" cy="853514"/>
+          </a:xfrm>
+          <a:prstGeom prst="rect">
+            <a:avLst/>
+          </a:prstGeom>
+          <a:noFill/>
+          <a:ln w="9525">
+            <a:noFill/>
+            <a:miter lim="800000"/>
+            <a:headEnd/>
+            <a:tailEnd/>
+          </a:ln>
+          <a:effectLst/>
+        </p:spPr>
+      </p:pic>
+      <p:pic>
+        <p:nvPicPr>
+          <p:cNvPr id="21" name="Picture 6"/>
+          <p:cNvPicPr>
+            <a:picLocks noChangeAspect="1" noChangeArrowheads="1"/>
+          </p:cNvPicPr>
+          <p:nvPr/>
+        </p:nvPicPr>
+        <p:blipFill>
+          <a:blip r:embed="rId3" cstate="print"/>
+          <a:srcRect/>
+          <a:stretch>
+            <a:fillRect/>
+          </a:stretch>
+        </p:blipFill>
+        <p:spPr bwMode="auto">
+          <a:xfrm>
+            <a:off x="6477001" y="1758645"/>
+            <a:ext cx="813887" cy="862659"/>
+          </a:xfrm>
+          <a:prstGeom prst="rect">
+            <a:avLst/>
+          </a:prstGeom>
+          <a:noFill/>
+          <a:ln w="9525">
+            <a:noFill/>
+            <a:miter lim="800000"/>
+            <a:headEnd/>
+            <a:tailEnd/>
+          </a:ln>
+          <a:effectLst/>
+        </p:spPr>
+      </p:pic>
+      <p:pic>
+        <p:nvPicPr>
+          <p:cNvPr id="22" name="Picture 26"/>
+          <p:cNvPicPr>
+            <a:picLocks noChangeAspect="1" noChangeArrowheads="1"/>
+          </p:cNvPicPr>
+          <p:nvPr/>
+        </p:nvPicPr>
+        <p:blipFill>
+          <a:blip r:embed="rId4" cstate="print"/>
+          <a:srcRect/>
+          <a:stretch>
+            <a:fillRect/>
+          </a:stretch>
+        </p:blipFill>
+        <p:spPr bwMode="auto">
+          <a:xfrm>
+            <a:off x="2514601" y="2133601"/>
+            <a:ext cx="659949" cy="914479"/>
+          </a:xfrm>
+          <a:prstGeom prst="rect">
+            <a:avLst/>
+          </a:prstGeom>
+          <a:noFill/>
+          <a:ln w="9525">
+            <a:noFill/>
+            <a:miter lim="800000"/>
+            <a:headEnd/>
+            <a:tailEnd/>
+          </a:ln>
+          <a:effectLst/>
+        </p:spPr>
+      </p:pic>
+      <p:pic>
+        <p:nvPicPr>
+          <p:cNvPr id="24" name="Picture 28"/>
+          <p:cNvPicPr>
+            <a:picLocks noChangeAspect="1" noChangeArrowheads="1"/>
+          </p:cNvPicPr>
+          <p:nvPr/>
+        </p:nvPicPr>
+        <p:blipFill>
+          <a:blip r:embed="rId5" cstate="print"/>
+          <a:srcRect/>
+          <a:stretch>
+            <a:fillRect/>
+          </a:stretch>
+        </p:blipFill>
+        <p:spPr bwMode="auto">
+          <a:xfrm>
+            <a:off x="8382001" y="1530045"/>
+            <a:ext cx="934293" cy="768163"/>
+          </a:xfrm>
+          <a:prstGeom prst="rect">
+            <a:avLst/>
+          </a:prstGeom>
+          <a:noFill/>
+          <a:ln w="9525">
+            <a:noFill/>
+            <a:miter lim="800000"/>
+            <a:headEnd/>
+            <a:tailEnd/>
+          </a:ln>
+          <a:effectLst/>
+        </p:spPr>
+      </p:pic>
+      <p:pic>
+        <p:nvPicPr>
+          <p:cNvPr id="25" name="Picture 4"/>
+          <p:cNvPicPr>
+            <a:picLocks noChangeAspect="1" noChangeArrowheads="1"/>
+          </p:cNvPicPr>
+          <p:nvPr/>
+        </p:nvPicPr>
+        <p:blipFill>
+          <a:blip r:embed="rId6" cstate="print"/>
+          <a:srcRect/>
+          <a:stretch>
+            <a:fillRect/>
+          </a:stretch>
+        </p:blipFill>
+        <p:spPr bwMode="auto">
+          <a:xfrm>
+            <a:off x="3733801" y="2767390"/>
+            <a:ext cx="745301" cy="914479"/>
+          </a:xfrm>
+          <a:prstGeom prst="rect">
+            <a:avLst/>
+          </a:prstGeom>
+          <a:noFill/>
+          <a:ln w="9525">
+            <a:noFill/>
+            <a:miter lim="800000"/>
+            <a:headEnd/>
+            <a:tailEnd/>
+          </a:ln>
+          <a:effectLst/>
+        </p:spPr>
+      </p:pic>
+      <p:pic>
+        <p:nvPicPr>
+          <p:cNvPr id="28" name="Picture 5"/>
+          <p:cNvPicPr>
+            <a:picLocks noChangeAspect="1" noChangeArrowheads="1"/>
+          </p:cNvPicPr>
+          <p:nvPr/>
+        </p:nvPicPr>
+        <p:blipFill>
+          <a:blip r:embed="rId7" cstate="print"/>
+          <a:srcRect/>
+          <a:stretch>
+            <a:fillRect/>
+          </a:stretch>
+        </p:blipFill>
+        <p:spPr bwMode="auto">
+          <a:xfrm>
+            <a:off x="9178976" y="2814624"/>
+            <a:ext cx="879424" cy="882473"/>
+          </a:xfrm>
+          <a:prstGeom prst="rect">
+            <a:avLst/>
+          </a:prstGeom>
+          <a:noFill/>
+          <a:ln w="9525">
+            <a:noFill/>
+            <a:miter lim="800000"/>
+            <a:headEnd/>
+            <a:tailEnd/>
+          </a:ln>
+          <a:effectLst/>
+        </p:spPr>
+      </p:pic>
+      <p:pic>
+        <p:nvPicPr>
+          <p:cNvPr id="29" name="Picture 6"/>
+          <p:cNvPicPr>
+            <a:picLocks noChangeAspect="1" noChangeArrowheads="1"/>
+          </p:cNvPicPr>
+          <p:nvPr/>
+        </p:nvPicPr>
+        <p:blipFill>
+          <a:blip r:embed="rId8" cstate="print"/>
+          <a:srcRect/>
+          <a:stretch>
+            <a:fillRect/>
+          </a:stretch>
+        </p:blipFill>
+        <p:spPr bwMode="auto">
+          <a:xfrm>
+            <a:off x="2590800" y="3739844"/>
+            <a:ext cx="626418" cy="900762"/>
+          </a:xfrm>
+          <a:prstGeom prst="rect">
+            <a:avLst/>
+          </a:prstGeom>
+          <a:noFill/>
+          <a:ln w="9525">
+            <a:noFill/>
+            <a:miter lim="800000"/>
+            <a:headEnd/>
+            <a:tailEnd/>
+          </a:ln>
+          <a:effectLst/>
+        </p:spPr>
+      </p:pic>
+      <p:pic>
+        <p:nvPicPr>
+          <p:cNvPr id="30" name="Picture 44"/>
+          <p:cNvPicPr>
+            <a:picLocks noChangeAspect="1" noChangeArrowheads="1"/>
+          </p:cNvPicPr>
+          <p:nvPr/>
+        </p:nvPicPr>
+        <p:blipFill>
+          <a:blip r:embed="rId9" cstate="print"/>
+          <a:srcRect/>
+          <a:stretch>
+            <a:fillRect/>
+          </a:stretch>
+        </p:blipFill>
+        <p:spPr bwMode="auto">
+          <a:xfrm>
+            <a:off x="5486401" y="4495800"/>
+            <a:ext cx="746825" cy="920576"/>
+          </a:xfrm>
+          <a:prstGeom prst="rect">
+            <a:avLst/>
+          </a:prstGeom>
+          <a:noFill/>
+          <a:ln w="9525">
+            <a:noFill/>
+            <a:miter lim="800000"/>
+            <a:headEnd/>
+            <a:tailEnd/>
+          </a:ln>
+          <a:effectLst/>
+        </p:spPr>
+      </p:pic>
+      <p:pic>
+        <p:nvPicPr>
+          <p:cNvPr id="31" name="Picture 7"/>
+          <p:cNvPicPr>
+            <a:picLocks noChangeAspect="1" noChangeArrowheads="1"/>
+          </p:cNvPicPr>
+          <p:nvPr/>
+        </p:nvPicPr>
+        <p:blipFill>
+          <a:blip r:embed="rId10" cstate="print"/>
+          <a:srcRect/>
+          <a:stretch>
+            <a:fillRect/>
+          </a:stretch>
+        </p:blipFill>
+        <p:spPr bwMode="auto">
+          <a:xfrm>
+            <a:off x="3810001" y="4001896"/>
+            <a:ext cx="931245" cy="858086"/>
+          </a:xfrm>
+          <a:prstGeom prst="rect">
+            <a:avLst/>
+          </a:prstGeom>
+          <a:noFill/>
+          <a:ln w="9525">
+            <a:noFill/>
+            <a:miter lim="800000"/>
+            <a:headEnd/>
+            <a:tailEnd/>
+          </a:ln>
+          <a:effectLst/>
+        </p:spPr>
+      </p:pic>
+      <p:pic>
+        <p:nvPicPr>
+          <p:cNvPr id="32" name="Picture 8"/>
+          <p:cNvPicPr>
+            <a:picLocks noChangeAspect="1" noChangeArrowheads="1"/>
+          </p:cNvPicPr>
+          <p:nvPr/>
+        </p:nvPicPr>
+        <p:blipFill>
+          <a:blip r:embed="rId11" cstate="print"/>
+          <a:srcRect/>
+          <a:stretch>
+            <a:fillRect/>
+          </a:stretch>
+        </p:blipFill>
+        <p:spPr bwMode="auto">
+          <a:xfrm>
+            <a:off x="8382001" y="4038601"/>
+            <a:ext cx="955631" cy="842845"/>
+          </a:xfrm>
+          <a:prstGeom prst="rect">
+            <a:avLst/>
+          </a:prstGeom>
+          <a:noFill/>
+          <a:ln w="9525">
+            <a:noFill/>
+            <a:miter lim="800000"/>
+            <a:headEnd/>
+            <a:tailEnd/>
+          </a:ln>
+          <a:effectLst/>
+        </p:spPr>
+      </p:pic>
+      <p:pic>
+        <p:nvPicPr>
+          <p:cNvPr id="33" name="Picture 6"/>
+          <p:cNvPicPr>
+            <a:picLocks noChangeAspect="1" noChangeArrowheads="1"/>
+          </p:cNvPicPr>
+          <p:nvPr/>
+        </p:nvPicPr>
+        <p:blipFill>
+          <a:blip r:embed="rId12" cstate="print"/>
+          <a:srcRect/>
+          <a:stretch>
+            <a:fillRect/>
+          </a:stretch>
+        </p:blipFill>
+        <p:spPr bwMode="auto">
+          <a:xfrm>
+            <a:off x="4267201" y="5410200"/>
+            <a:ext cx="789501" cy="603556"/>
+          </a:xfrm>
+          <a:prstGeom prst="rect">
+            <a:avLst/>
+          </a:prstGeom>
+          <a:noFill/>
+          <a:ln w="9525">
+            <a:noFill/>
+            <a:miter lim="800000"/>
+            <a:headEnd/>
+            <a:tailEnd/>
+          </a:ln>
+          <a:effectLst/>
+        </p:spPr>
+      </p:pic>
+      <p:pic>
+        <p:nvPicPr>
+          <p:cNvPr id="34" name="Picture 8"/>
+          <p:cNvPicPr>
+            <a:picLocks noChangeAspect="1" noChangeArrowheads="1"/>
+          </p:cNvPicPr>
+          <p:nvPr/>
+        </p:nvPicPr>
+        <p:blipFill>
+          <a:blip r:embed="rId13" cstate="print"/>
+          <a:srcRect/>
+          <a:stretch>
+            <a:fillRect/>
+          </a:stretch>
+        </p:blipFill>
+        <p:spPr bwMode="auto">
+          <a:xfrm>
+            <a:off x="6629400" y="3886200"/>
+            <a:ext cx="784928" cy="880948"/>
+          </a:xfrm>
+          <a:prstGeom prst="rect">
+            <a:avLst/>
+          </a:prstGeom>
+          <a:noFill/>
+          <a:ln w="9525">
+            <a:noFill/>
+            <a:miter lim="800000"/>
+            <a:headEnd/>
+            <a:tailEnd/>
+          </a:ln>
+          <a:effectLst/>
+        </p:spPr>
+      </p:pic>
+      <p:pic>
+        <p:nvPicPr>
+          <p:cNvPr id="37" name="Picture 6"/>
+          <p:cNvPicPr>
+            <a:picLocks noChangeAspect="1" noChangeArrowheads="1"/>
+          </p:cNvPicPr>
+          <p:nvPr/>
+        </p:nvPicPr>
+        <p:blipFill>
+          <a:blip r:embed="rId14" cstate="print"/>
+          <a:srcRect/>
+          <a:stretch>
+            <a:fillRect/>
+          </a:stretch>
+        </p:blipFill>
+        <p:spPr bwMode="auto">
+          <a:xfrm>
+            <a:off x="5410201" y="2749245"/>
+            <a:ext cx="678239" cy="862659"/>
+          </a:xfrm>
+          <a:prstGeom prst="rect">
+            <a:avLst/>
+          </a:prstGeom>
+          <a:noFill/>
+          <a:ln w="9525">
+            <a:noFill/>
+            <a:miter lim="800000"/>
+            <a:headEnd/>
+            <a:tailEnd/>
+          </a:ln>
+          <a:effectLst/>
+        </p:spPr>
+      </p:pic>
+      <p:pic>
+        <p:nvPicPr>
+          <p:cNvPr id="38" name="Picture 6"/>
+          <p:cNvPicPr>
+            <a:picLocks noChangeAspect="1" noChangeArrowheads="1"/>
+          </p:cNvPicPr>
+          <p:nvPr/>
+        </p:nvPicPr>
+        <p:blipFill>
+          <a:blip r:embed="rId15" cstate="print"/>
+          <a:srcRect/>
+          <a:stretch>
+            <a:fillRect/>
+          </a:stretch>
+        </p:blipFill>
+        <p:spPr bwMode="auto">
+          <a:xfrm>
+            <a:off x="7467600" y="2706497"/>
+            <a:ext cx="850466" cy="777307"/>
+          </a:xfrm>
+          <a:prstGeom prst="rect">
+            <a:avLst/>
+          </a:prstGeom>
+          <a:noFill/>
+          <a:ln w="9525">
+            <a:noFill/>
+            <a:miter lim="800000"/>
+            <a:headEnd/>
+            <a:tailEnd/>
+          </a:ln>
+          <a:effectLst/>
+        </p:spPr>
+      </p:pic>
+      <p:pic>
+        <p:nvPicPr>
+          <p:cNvPr id="39" name="Picture 31"/>
+          <p:cNvPicPr>
+            <a:picLocks noChangeAspect="1" noChangeArrowheads="1"/>
+          </p:cNvPicPr>
+          <p:nvPr/>
+        </p:nvPicPr>
+        <p:blipFill>
+          <a:blip r:embed="rId16" cstate="print"/>
+          <a:srcRect/>
+          <a:stretch>
+            <a:fillRect/>
+          </a:stretch>
+        </p:blipFill>
+        <p:spPr bwMode="auto">
+          <a:xfrm>
+            <a:off x="7848601" y="5029201"/>
+            <a:ext cx="563929" cy="951059"/>
+          </a:xfrm>
+          <a:prstGeom prst="rect">
+            <a:avLst/>
+          </a:prstGeom>
+          <a:noFill/>
+          <a:ln w="9525">
+            <a:noFill/>
+            <a:miter lim="800000"/>
+            <a:headEnd/>
+            <a:tailEnd/>
+          </a:ln>
+          <a:effectLst/>
+        </p:spPr>
+      </p:pic>
+    </p:spTree>
+  </p:cSld>
+  <p:clrMapOvr>
+    <a:masterClrMapping/>
+  </p:clrMapOvr>
+</p:sld>
+</file>
+
+<file path=ppt/slides/slide11.xml><?xml version="1.0" encoding="utf-8"?>
+<p:sld xmlns:a="http://schemas.openxmlformats.org/drawingml/2006/main" xmlns:r="http://schemas.openxmlformats.org/officeDocument/2006/relationships" xmlns:p="http://schemas.openxmlformats.org/presentationml/2006/main">
+  <p:cSld>
+    <p:spTree>
+      <p:nvGrpSpPr>
+        <p:cNvPr id="1" name=""/>
+        <p:cNvGrpSpPr/>
+        <p:nvPr/>
+      </p:nvGrpSpPr>
+      <p:grpSpPr>
+        <a:xfrm>
+          <a:off x="0" y="0"/>
+          <a:ext cx="0" cy="0"/>
+          <a:chOff x="0" y="0"/>
+          <a:chExt cx="0" cy="0"/>
+        </a:xfrm>
+      </p:grpSpPr>
       <p:cxnSp>
         <p:nvCxnSpPr>
           <p:cNvPr id="22" name="Straight Arrow Connector 21"/>
@@ -7589,7 +8277,7 @@
 </p:sld>
 </file>
 
-<file path=ppt/slides/slide11.xml><?xml version="1.0" encoding="utf-8"?>
+<file path=ppt/slides/slide12.xml><?xml version="1.0" encoding="utf-8"?>
 <p:sld xmlns:a="http://schemas.openxmlformats.org/drawingml/2006/main" xmlns:r="http://schemas.openxmlformats.org/officeDocument/2006/relationships" xmlns:p="http://schemas.openxmlformats.org/presentationml/2006/main">
   <p:cSld>
     <p:spTree>
@@ -16157,6 +16845,1842 @@
           <a:chExt cx="0" cy="0"/>
         </a:xfrm>
       </p:grpSpPr>
+      <p:grpSp>
+        <p:nvGrpSpPr>
+          <p:cNvPr id="5" name="Group 4">
+            <a:extLst>
+              <a:ext uri="{FF2B5EF4-FFF2-40B4-BE49-F238E27FC236}">
+                <a16:creationId xmlns:a16="http://schemas.microsoft.com/office/drawing/2014/main" id="{BCA0AC3B-F97B-49C3-BDF5-38838D103948}"/>
+              </a:ext>
+            </a:extLst>
+          </p:cNvPr>
+          <p:cNvGrpSpPr/>
+          <p:nvPr/>
+        </p:nvGrpSpPr>
+        <p:grpSpPr>
+          <a:xfrm>
+            <a:off x="132768" y="967628"/>
+            <a:ext cx="11870501" cy="4812710"/>
+            <a:chOff x="132768" y="1124240"/>
+            <a:chExt cx="11870501" cy="4812710"/>
+          </a:xfrm>
+        </p:grpSpPr>
+        <p:sp>
+          <p:nvSpPr>
+            <p:cNvPr id="6" name="Rectangle: Rounded Corners 5">
+              <a:extLst>
+                <a:ext uri="{FF2B5EF4-FFF2-40B4-BE49-F238E27FC236}">
+                  <a16:creationId xmlns:a16="http://schemas.microsoft.com/office/drawing/2014/main" id="{F666050D-7BC1-4FA6-8DA4-CBA19396DDCF}"/>
+                </a:ext>
+              </a:extLst>
+            </p:cNvPr>
+            <p:cNvSpPr/>
+            <p:nvPr/>
+          </p:nvSpPr>
+          <p:spPr>
+            <a:xfrm>
+              <a:off x="1215910" y="4524466"/>
+              <a:ext cx="10787359" cy="1412484"/>
+            </a:xfrm>
+            <a:prstGeom prst="roundRect">
+              <a:avLst>
+                <a:gd name="adj" fmla="val 9182"/>
+              </a:avLst>
+            </a:prstGeom>
+            <a:solidFill>
+              <a:schemeClr val="accent6">
+                <a:lumMod val="20000"/>
+                <a:lumOff val="80000"/>
+              </a:schemeClr>
+            </a:solidFill>
+          </p:spPr>
+          <p:style>
+            <a:lnRef idx="2">
+              <a:schemeClr val="accent1">
+                <a:shade val="50000"/>
+              </a:schemeClr>
+            </a:lnRef>
+            <a:fillRef idx="1">
+              <a:schemeClr val="accent1"/>
+            </a:fillRef>
+            <a:effectRef idx="0">
+              <a:schemeClr val="accent1"/>
+            </a:effectRef>
+            <a:fontRef idx="minor">
+              <a:schemeClr val="lt1"/>
+            </a:fontRef>
+          </p:style>
+          <p:txBody>
+            <a:bodyPr rtlCol="0" anchor="ctr"/>
+            <a:lstStyle/>
+            <a:p>
+              <a:pPr algn="ctr"/>
+              <a:endParaRPr lang="en-US" sz="2400" b="1">
+                <a:solidFill>
+                  <a:schemeClr val="tx1"/>
+                </a:solidFill>
+              </a:endParaRPr>
+            </a:p>
+          </p:txBody>
+        </p:sp>
+        <p:sp>
+          <p:nvSpPr>
+            <p:cNvPr id="7" name="Rectangle: Rounded Corners 6">
+              <a:extLst>
+                <a:ext uri="{FF2B5EF4-FFF2-40B4-BE49-F238E27FC236}">
+                  <a16:creationId xmlns:a16="http://schemas.microsoft.com/office/drawing/2014/main" id="{B0901C88-D09D-4B6B-8432-AF5B1BFAF4B0}"/>
+                </a:ext>
+              </a:extLst>
+            </p:cNvPr>
+            <p:cNvSpPr/>
+            <p:nvPr/>
+          </p:nvSpPr>
+          <p:spPr>
+            <a:xfrm>
+              <a:off x="1215910" y="3017913"/>
+              <a:ext cx="10787359" cy="1412484"/>
+            </a:xfrm>
+            <a:prstGeom prst="roundRect">
+              <a:avLst>
+                <a:gd name="adj" fmla="val 9182"/>
+              </a:avLst>
+            </a:prstGeom>
+            <a:solidFill>
+              <a:schemeClr val="accent5">
+                <a:lumMod val="60000"/>
+                <a:lumOff val="40000"/>
+              </a:schemeClr>
+            </a:solidFill>
+          </p:spPr>
+          <p:style>
+            <a:lnRef idx="2">
+              <a:schemeClr val="accent1">
+                <a:shade val="50000"/>
+              </a:schemeClr>
+            </a:lnRef>
+            <a:fillRef idx="1">
+              <a:schemeClr val="accent1"/>
+            </a:fillRef>
+            <a:effectRef idx="0">
+              <a:schemeClr val="accent1"/>
+            </a:effectRef>
+            <a:fontRef idx="minor">
+              <a:schemeClr val="lt1"/>
+            </a:fontRef>
+          </p:style>
+          <p:txBody>
+            <a:bodyPr rtlCol="0" anchor="ctr"/>
+            <a:lstStyle/>
+            <a:p>
+              <a:pPr algn="ctr"/>
+              <a:endParaRPr lang="en-US" sz="2400" b="1">
+                <a:solidFill>
+                  <a:schemeClr val="tx1"/>
+                </a:solidFill>
+              </a:endParaRPr>
+            </a:p>
+          </p:txBody>
+        </p:sp>
+        <p:sp>
+          <p:nvSpPr>
+            <p:cNvPr id="8" name="Rectangle: Rounded Corners 7">
+              <a:extLst>
+                <a:ext uri="{FF2B5EF4-FFF2-40B4-BE49-F238E27FC236}">
+                  <a16:creationId xmlns:a16="http://schemas.microsoft.com/office/drawing/2014/main" id="{1409B06B-2574-481F-999E-B8603B5D50C3}"/>
+                </a:ext>
+              </a:extLst>
+            </p:cNvPr>
+            <p:cNvSpPr/>
+            <p:nvPr/>
+          </p:nvSpPr>
+          <p:spPr>
+            <a:xfrm>
+              <a:off x="1215910" y="1511360"/>
+              <a:ext cx="10787359" cy="1412484"/>
+            </a:xfrm>
+            <a:prstGeom prst="roundRect">
+              <a:avLst>
+                <a:gd name="adj" fmla="val 9182"/>
+              </a:avLst>
+            </a:prstGeom>
+            <a:solidFill>
+              <a:schemeClr val="accent4">
+                <a:lumMod val="20000"/>
+                <a:lumOff val="80000"/>
+              </a:schemeClr>
+            </a:solidFill>
+          </p:spPr>
+          <p:style>
+            <a:lnRef idx="2">
+              <a:schemeClr val="accent1">
+                <a:shade val="50000"/>
+              </a:schemeClr>
+            </a:lnRef>
+            <a:fillRef idx="1">
+              <a:schemeClr val="accent1"/>
+            </a:fillRef>
+            <a:effectRef idx="0">
+              <a:schemeClr val="accent1"/>
+            </a:effectRef>
+            <a:fontRef idx="minor">
+              <a:schemeClr val="lt1"/>
+            </a:fontRef>
+          </p:style>
+          <p:txBody>
+            <a:bodyPr rtlCol="0" anchor="ctr"/>
+            <a:lstStyle/>
+            <a:p>
+              <a:pPr algn="ctr"/>
+              <a:endParaRPr lang="en-US" sz="2400" b="1">
+                <a:solidFill>
+                  <a:schemeClr val="tx1"/>
+                </a:solidFill>
+              </a:endParaRPr>
+            </a:p>
+          </p:txBody>
+        </p:sp>
+        <p:sp>
+          <p:nvSpPr>
+            <p:cNvPr id="10" name="TextBox 9">
+              <a:extLst>
+                <a:ext uri="{FF2B5EF4-FFF2-40B4-BE49-F238E27FC236}">
+                  <a16:creationId xmlns:a16="http://schemas.microsoft.com/office/drawing/2014/main" id="{A5CA2806-6DC3-4FCB-9296-F73913E98652}"/>
+                </a:ext>
+              </a:extLst>
+            </p:cNvPr>
+            <p:cNvSpPr txBox="1"/>
+            <p:nvPr/>
+          </p:nvSpPr>
+          <p:spPr>
+            <a:xfrm rot="16200000">
+              <a:off x="404676" y="5027872"/>
+              <a:ext cx="1216802" cy="405671"/>
+            </a:xfrm>
+            <a:prstGeom prst="rect">
+              <a:avLst/>
+            </a:prstGeom>
+          </p:spPr>
+          <p:txBody>
+            <a:bodyPr wrap="none" rtlCol="0">
+              <a:spAutoFit/>
+            </a:bodyPr>
+            <a:lstStyle/>
+            <a:p>
+              <a:r>
+                <a:rPr lang="en-US" b="1" dirty="0"/>
+                <a:t>T1 – Data</a:t>
+              </a:r>
+            </a:p>
+          </p:txBody>
+        </p:sp>
+        <p:sp>
+          <p:nvSpPr>
+            <p:cNvPr id="11" name="TextBox 10">
+              <a:extLst>
+                <a:ext uri="{FF2B5EF4-FFF2-40B4-BE49-F238E27FC236}">
+                  <a16:creationId xmlns:a16="http://schemas.microsoft.com/office/drawing/2014/main" id="{3C394B27-713E-4355-9DF5-63B82D16C924}"/>
+                </a:ext>
+              </a:extLst>
+            </p:cNvPr>
+            <p:cNvSpPr txBox="1"/>
+            <p:nvPr/>
+          </p:nvSpPr>
+          <p:spPr>
+            <a:xfrm rot="16200000">
+              <a:off x="382561" y="3522691"/>
+              <a:ext cx="1261031" cy="405671"/>
+            </a:xfrm>
+            <a:prstGeom prst="rect">
+              <a:avLst/>
+            </a:prstGeom>
+          </p:spPr>
+          <p:txBody>
+            <a:bodyPr wrap="none" rtlCol="0">
+              <a:spAutoFit/>
+            </a:bodyPr>
+            <a:lstStyle/>
+            <a:p>
+              <a:r>
+                <a:rPr lang="en-US" b="1" dirty="0"/>
+                <a:t>T2 – Logic</a:t>
+              </a:r>
+            </a:p>
+          </p:txBody>
+        </p:sp>
+        <p:sp>
+          <p:nvSpPr>
+            <p:cNvPr id="12" name="TextBox 11">
+              <a:extLst>
+                <a:ext uri="{FF2B5EF4-FFF2-40B4-BE49-F238E27FC236}">
+                  <a16:creationId xmlns:a16="http://schemas.microsoft.com/office/drawing/2014/main" id="{6B3B268D-1BA0-498C-86F6-A28C626F95C4}"/>
+                </a:ext>
+              </a:extLst>
+            </p:cNvPr>
+            <p:cNvSpPr txBox="1"/>
+            <p:nvPr/>
+          </p:nvSpPr>
+          <p:spPr>
+            <a:xfrm rot="16200000">
+              <a:off x="333212" y="1939052"/>
+              <a:ext cx="1358927" cy="405671"/>
+            </a:xfrm>
+            <a:prstGeom prst="rect">
+              <a:avLst/>
+            </a:prstGeom>
+          </p:spPr>
+          <p:txBody>
+            <a:bodyPr wrap="none" rtlCol="0">
+              <a:spAutoFit/>
+            </a:bodyPr>
+            <a:lstStyle/>
+            <a:p>
+              <a:r>
+                <a:rPr lang="en-US" b="1" dirty="0"/>
+                <a:t>T3 – Forms</a:t>
+              </a:r>
+            </a:p>
+          </p:txBody>
+        </p:sp>
+        <p:sp>
+          <p:nvSpPr>
+            <p:cNvPr id="13" name="Rectangle: Rounded Corners 12">
+              <a:extLst>
+                <a:ext uri="{FF2B5EF4-FFF2-40B4-BE49-F238E27FC236}">
+                  <a16:creationId xmlns:a16="http://schemas.microsoft.com/office/drawing/2014/main" id="{77BD3CC5-09FD-4544-9137-D38042D2D8D1}"/>
+                </a:ext>
+              </a:extLst>
+            </p:cNvPr>
+            <p:cNvSpPr/>
+            <p:nvPr/>
+          </p:nvSpPr>
+          <p:spPr>
+            <a:xfrm>
+              <a:off x="1392512" y="1630057"/>
+              <a:ext cx="2528543" cy="4188840"/>
+            </a:xfrm>
+            <a:prstGeom prst="roundRect">
+              <a:avLst>
+                <a:gd name="adj" fmla="val 4472"/>
+              </a:avLst>
+            </a:prstGeom>
+            <a:solidFill>
+              <a:srgbClr val="A72931">
+                <a:alpha val="80000"/>
+              </a:srgbClr>
+            </a:solidFill>
+          </p:spPr>
+          <p:style>
+            <a:lnRef idx="2">
+              <a:schemeClr val="accent1">
+                <a:shade val="50000"/>
+              </a:schemeClr>
+            </a:lnRef>
+            <a:fillRef idx="1">
+              <a:schemeClr val="accent1"/>
+            </a:fillRef>
+            <a:effectRef idx="0">
+              <a:schemeClr val="accent1"/>
+            </a:effectRef>
+            <a:fontRef idx="minor">
+              <a:schemeClr val="lt1"/>
+            </a:fontRef>
+          </p:style>
+          <p:txBody>
+            <a:bodyPr rtlCol="0" anchor="ctr"/>
+            <a:lstStyle/>
+            <a:p>
+              <a:pPr algn="ctr"/>
+              <a:endParaRPr lang="en-US" sz="1700" b="1" dirty="0">
+                <a:solidFill>
+                  <a:schemeClr val="bg1"/>
+                </a:solidFill>
+              </a:endParaRPr>
+            </a:p>
+          </p:txBody>
+        </p:sp>
+        <p:sp>
+          <p:nvSpPr>
+            <p:cNvPr id="15" name="Rectangle: Rounded Corners 14">
+              <a:extLst>
+                <a:ext uri="{FF2B5EF4-FFF2-40B4-BE49-F238E27FC236}">
+                  <a16:creationId xmlns:a16="http://schemas.microsoft.com/office/drawing/2014/main" id="{038D4680-8C71-4D99-97E4-E0E6982C55EE}"/>
+                </a:ext>
+              </a:extLst>
+            </p:cNvPr>
+            <p:cNvSpPr/>
+            <p:nvPr/>
+          </p:nvSpPr>
+          <p:spPr>
+            <a:xfrm>
+              <a:off x="4026775" y="1630057"/>
+              <a:ext cx="2528543" cy="4188840"/>
+            </a:xfrm>
+            <a:prstGeom prst="roundRect">
+              <a:avLst>
+                <a:gd name="adj" fmla="val 4472"/>
+              </a:avLst>
+            </a:prstGeom>
+            <a:solidFill>
+              <a:srgbClr val="C55A11">
+                <a:alpha val="80000"/>
+              </a:srgbClr>
+            </a:solidFill>
+          </p:spPr>
+          <p:style>
+            <a:lnRef idx="2">
+              <a:schemeClr val="accent1">
+                <a:shade val="50000"/>
+              </a:schemeClr>
+            </a:lnRef>
+            <a:fillRef idx="1">
+              <a:schemeClr val="accent1"/>
+            </a:fillRef>
+            <a:effectRef idx="0">
+              <a:schemeClr val="accent1"/>
+            </a:effectRef>
+            <a:fontRef idx="minor">
+              <a:schemeClr val="lt1"/>
+            </a:fontRef>
+          </p:style>
+          <p:txBody>
+            <a:bodyPr rtlCol="0" anchor="ctr"/>
+            <a:lstStyle/>
+            <a:p>
+              <a:pPr algn="ctr"/>
+              <a:endParaRPr lang="en-US" sz="1700" b="1" dirty="0">
+                <a:solidFill>
+                  <a:schemeClr val="bg1"/>
+                </a:solidFill>
+              </a:endParaRPr>
+            </a:p>
+          </p:txBody>
+        </p:sp>
+        <p:sp>
+          <p:nvSpPr>
+            <p:cNvPr id="16" name="Rectangle: Rounded Corners 15">
+              <a:extLst>
+                <a:ext uri="{FF2B5EF4-FFF2-40B4-BE49-F238E27FC236}">
+                  <a16:creationId xmlns:a16="http://schemas.microsoft.com/office/drawing/2014/main" id="{AD68036E-F5A0-4CAD-8469-572E8F9B44DF}"/>
+                </a:ext>
+              </a:extLst>
+            </p:cNvPr>
+            <p:cNvSpPr/>
+            <p:nvPr/>
+          </p:nvSpPr>
+          <p:spPr>
+            <a:xfrm>
+              <a:off x="6661041" y="1630057"/>
+              <a:ext cx="2528543" cy="4188840"/>
+            </a:xfrm>
+            <a:prstGeom prst="roundRect">
+              <a:avLst>
+                <a:gd name="adj" fmla="val 4472"/>
+              </a:avLst>
+            </a:prstGeom>
+            <a:solidFill>
+              <a:srgbClr val="00B050">
+                <a:alpha val="80000"/>
+              </a:srgbClr>
+            </a:solidFill>
+          </p:spPr>
+          <p:style>
+            <a:lnRef idx="2">
+              <a:schemeClr val="accent1">
+                <a:shade val="50000"/>
+              </a:schemeClr>
+            </a:lnRef>
+            <a:fillRef idx="1">
+              <a:schemeClr val="accent1"/>
+            </a:fillRef>
+            <a:effectRef idx="0">
+              <a:schemeClr val="accent1"/>
+            </a:effectRef>
+            <a:fontRef idx="minor">
+              <a:schemeClr val="lt1"/>
+            </a:fontRef>
+          </p:style>
+          <p:txBody>
+            <a:bodyPr rtlCol="0" anchor="ctr"/>
+            <a:lstStyle/>
+            <a:p>
+              <a:pPr algn="ctr"/>
+              <a:endParaRPr lang="en-US" sz="1700" b="1">
+                <a:solidFill>
+                  <a:schemeClr val="bg1"/>
+                </a:solidFill>
+              </a:endParaRPr>
+            </a:p>
+          </p:txBody>
+        </p:sp>
+        <p:sp>
+          <p:nvSpPr>
+            <p:cNvPr id="17" name="Rectangle: Rounded Corners 16">
+              <a:extLst>
+                <a:ext uri="{FF2B5EF4-FFF2-40B4-BE49-F238E27FC236}">
+                  <a16:creationId xmlns:a16="http://schemas.microsoft.com/office/drawing/2014/main" id="{081A1799-89D5-4BC8-8AC5-BBE4FB959ED9}"/>
+                </a:ext>
+              </a:extLst>
+            </p:cNvPr>
+            <p:cNvSpPr/>
+            <p:nvPr/>
+          </p:nvSpPr>
+          <p:spPr>
+            <a:xfrm>
+              <a:off x="9295304" y="1630057"/>
+              <a:ext cx="2528543" cy="4188840"/>
+            </a:xfrm>
+            <a:prstGeom prst="roundRect">
+              <a:avLst>
+                <a:gd name="adj" fmla="val 4472"/>
+              </a:avLst>
+            </a:prstGeom>
+            <a:solidFill>
+              <a:srgbClr val="0070C0">
+                <a:alpha val="80000"/>
+              </a:srgbClr>
+            </a:solidFill>
+          </p:spPr>
+          <p:style>
+            <a:lnRef idx="2">
+              <a:schemeClr val="accent1">
+                <a:shade val="50000"/>
+              </a:schemeClr>
+            </a:lnRef>
+            <a:fillRef idx="1">
+              <a:schemeClr val="accent1"/>
+            </a:fillRef>
+            <a:effectRef idx="0">
+              <a:schemeClr val="accent1"/>
+            </a:effectRef>
+            <a:fontRef idx="minor">
+              <a:schemeClr val="lt1"/>
+            </a:fontRef>
+          </p:style>
+          <p:txBody>
+            <a:bodyPr rtlCol="0" anchor="ctr"/>
+            <a:lstStyle/>
+            <a:p>
+              <a:pPr algn="ctr"/>
+              <a:endParaRPr lang="en-US" sz="1700" b="1">
+                <a:solidFill>
+                  <a:schemeClr val="bg1"/>
+                </a:solidFill>
+              </a:endParaRPr>
+            </a:p>
+          </p:txBody>
+        </p:sp>
+        <p:sp>
+          <p:nvSpPr>
+            <p:cNvPr id="18" name="TextBox 17">
+              <a:extLst>
+                <a:ext uri="{FF2B5EF4-FFF2-40B4-BE49-F238E27FC236}">
+                  <a16:creationId xmlns:a16="http://schemas.microsoft.com/office/drawing/2014/main" id="{23DD6448-858B-434D-B1AF-53BAF15326C9}"/>
+                </a:ext>
+              </a:extLst>
+            </p:cNvPr>
+            <p:cNvSpPr txBox="1"/>
+            <p:nvPr/>
+          </p:nvSpPr>
+          <p:spPr>
+            <a:xfrm>
+              <a:off x="1837588" y="1130316"/>
+              <a:ext cx="1700789" cy="405671"/>
+            </a:xfrm>
+            <a:prstGeom prst="rect">
+              <a:avLst/>
+            </a:prstGeom>
+          </p:spPr>
+          <p:txBody>
+            <a:bodyPr wrap="none" rtlCol="0">
+              <a:spAutoFit/>
+            </a:bodyPr>
+            <a:lstStyle/>
+            <a:p>
+              <a:r>
+                <a:rPr lang="en-US" b="1" dirty="0">
+                  <a:solidFill>
+                    <a:srgbClr val="A72931"/>
+                  </a:solidFill>
+                </a:rPr>
+                <a:t>L1 – Narrative</a:t>
+              </a:r>
+            </a:p>
+          </p:txBody>
+        </p:sp>
+        <p:sp>
+          <p:nvSpPr>
+            <p:cNvPr id="19" name="TextBox 18">
+              <a:extLst>
+                <a:ext uri="{FF2B5EF4-FFF2-40B4-BE49-F238E27FC236}">
+                  <a16:creationId xmlns:a16="http://schemas.microsoft.com/office/drawing/2014/main" id="{5636F523-0825-47C2-8A8B-479583244062}"/>
+                </a:ext>
+              </a:extLst>
+            </p:cNvPr>
+            <p:cNvSpPr txBox="1"/>
+            <p:nvPr/>
+          </p:nvSpPr>
+          <p:spPr>
+            <a:xfrm>
+              <a:off x="4112842" y="1131239"/>
+              <a:ext cx="2333101" cy="405671"/>
+            </a:xfrm>
+            <a:prstGeom prst="rect">
+              <a:avLst/>
+            </a:prstGeom>
+          </p:spPr>
+          <p:txBody>
+            <a:bodyPr wrap="none" rtlCol="0">
+              <a:spAutoFit/>
+            </a:bodyPr>
+            <a:lstStyle/>
+            <a:p>
+              <a:r>
+                <a:rPr lang="en-US" b="1" dirty="0">
+                  <a:solidFill>
+                    <a:schemeClr val="accent2">
+                      <a:lumMod val="75000"/>
+                    </a:schemeClr>
+                  </a:solidFill>
+                </a:rPr>
+                <a:t>L2 – Semi-Structured</a:t>
+              </a:r>
+            </a:p>
+          </p:txBody>
+        </p:sp>
+        <p:sp>
+          <p:nvSpPr>
+            <p:cNvPr id="20" name="TextBox 19">
+              <a:extLst>
+                <a:ext uri="{FF2B5EF4-FFF2-40B4-BE49-F238E27FC236}">
+                  <a16:creationId xmlns:a16="http://schemas.microsoft.com/office/drawing/2014/main" id="{D09F1CF1-B390-4D93-BD51-5201428454D9}"/>
+                </a:ext>
+              </a:extLst>
+            </p:cNvPr>
+            <p:cNvSpPr txBox="1"/>
+            <p:nvPr/>
+          </p:nvSpPr>
+          <p:spPr>
+            <a:xfrm>
+              <a:off x="7037624" y="1140982"/>
+              <a:ext cx="1745019" cy="405671"/>
+            </a:xfrm>
+            <a:prstGeom prst="rect">
+              <a:avLst/>
+            </a:prstGeom>
+          </p:spPr>
+          <p:txBody>
+            <a:bodyPr wrap="none" rtlCol="0">
+              <a:spAutoFit/>
+            </a:bodyPr>
+            <a:lstStyle/>
+            <a:p>
+              <a:r>
+                <a:rPr lang="en-US" b="1" dirty="0">
+                  <a:solidFill>
+                    <a:srgbClr val="00B050"/>
+                  </a:solidFill>
+                </a:rPr>
+                <a:t>L3 – Structured</a:t>
+              </a:r>
+            </a:p>
+          </p:txBody>
+        </p:sp>
+        <p:sp>
+          <p:nvSpPr>
+            <p:cNvPr id="21" name="TextBox 20">
+              <a:extLst>
+                <a:ext uri="{FF2B5EF4-FFF2-40B4-BE49-F238E27FC236}">
+                  <a16:creationId xmlns:a16="http://schemas.microsoft.com/office/drawing/2014/main" id="{C53728CB-4022-4473-A622-92E26ED32FD3}"/>
+                </a:ext>
+              </a:extLst>
+            </p:cNvPr>
+            <p:cNvSpPr txBox="1"/>
+            <p:nvPr/>
+          </p:nvSpPr>
+          <p:spPr>
+            <a:xfrm>
+              <a:off x="9661045" y="1124240"/>
+              <a:ext cx="1836788" cy="405671"/>
+            </a:xfrm>
+            <a:prstGeom prst="rect">
+              <a:avLst/>
+            </a:prstGeom>
+          </p:spPr>
+          <p:txBody>
+            <a:bodyPr wrap="none" rtlCol="0">
+              <a:spAutoFit/>
+            </a:bodyPr>
+            <a:lstStyle/>
+            <a:p>
+              <a:r>
+                <a:rPr lang="en-US" b="1" dirty="0">
+                  <a:solidFill>
+                    <a:srgbClr val="0070C0"/>
+                  </a:solidFill>
+                </a:rPr>
+                <a:t>L4 – Executable</a:t>
+              </a:r>
+            </a:p>
+          </p:txBody>
+        </p:sp>
+        <p:pic>
+          <p:nvPicPr>
+            <p:cNvPr id="27" name="Picture 26" descr="A black sign with white text&#10;&#10;Description automatically generated">
+              <a:extLst>
+                <a:ext uri="{FF2B5EF4-FFF2-40B4-BE49-F238E27FC236}">
+                  <a16:creationId xmlns:a16="http://schemas.microsoft.com/office/drawing/2014/main" id="{D69F59B7-5967-4E41-AED1-1A16456DEB25}"/>
+                </a:ext>
+              </a:extLst>
+            </p:cNvPr>
+            <p:cNvPicPr>
+              <a:picLocks noChangeAspect="1"/>
+            </p:cNvPicPr>
+            <p:nvPr/>
+          </p:nvPicPr>
+          <p:blipFill>
+            <a:blip r:embed="rId3">
+              <a:duotone>
+                <a:schemeClr val="accent4">
+                  <a:shade val="45000"/>
+                  <a:satMod val="135000"/>
+                </a:schemeClr>
+                <a:prstClr val="white"/>
+              </a:duotone>
+            </a:blip>
+            <a:stretch>
+              <a:fillRect/>
+            </a:stretch>
+          </p:blipFill>
+          <p:spPr>
+            <a:xfrm>
+              <a:off x="189422" y="1751906"/>
+              <a:ext cx="592490" cy="741698"/>
+            </a:xfrm>
+            <a:prstGeom prst="rect">
+              <a:avLst/>
+            </a:prstGeom>
+          </p:spPr>
+        </p:pic>
+        <p:pic>
+          <p:nvPicPr>
+            <p:cNvPr id="1024" name="Picture 1023">
+              <a:extLst>
+                <a:ext uri="{FF2B5EF4-FFF2-40B4-BE49-F238E27FC236}">
+                  <a16:creationId xmlns:a16="http://schemas.microsoft.com/office/drawing/2014/main" id="{D577DEBF-E3CC-4C38-B5D1-E526D5FF50AB}"/>
+                </a:ext>
+              </a:extLst>
+            </p:cNvPr>
+            <p:cNvPicPr>
+              <a:picLocks noChangeAspect="1"/>
+            </p:cNvPicPr>
+            <p:nvPr/>
+          </p:nvPicPr>
+          <p:blipFill>
+            <a:blip r:embed="rId4">
+              <a:duotone>
+                <a:schemeClr val="accent6">
+                  <a:shade val="45000"/>
+                  <a:satMod val="135000"/>
+                </a:schemeClr>
+                <a:prstClr val="white"/>
+              </a:duotone>
+            </a:blip>
+            <a:stretch>
+              <a:fillRect/>
+            </a:stretch>
+          </p:blipFill>
+          <p:spPr>
+            <a:xfrm>
+              <a:off x="140874" y="4898431"/>
+              <a:ext cx="649145" cy="649145"/>
+            </a:xfrm>
+            <a:prstGeom prst="rect">
+              <a:avLst/>
+            </a:prstGeom>
+          </p:spPr>
+        </p:pic>
+        <p:pic>
+          <p:nvPicPr>
+            <p:cNvPr id="1037" name="Picture 1036" descr="A circuit board&#10;&#10;Description automatically generated">
+              <a:extLst>
+                <a:ext uri="{FF2B5EF4-FFF2-40B4-BE49-F238E27FC236}">
+                  <a16:creationId xmlns:a16="http://schemas.microsoft.com/office/drawing/2014/main" id="{12C82FC5-6784-403E-B600-B476893B63F3}"/>
+                </a:ext>
+              </a:extLst>
+            </p:cNvPr>
+            <p:cNvPicPr>
+              <a:picLocks noChangeAspect="1"/>
+            </p:cNvPicPr>
+            <p:nvPr/>
+          </p:nvPicPr>
+          <p:blipFill>
+            <a:blip r:embed="rId5">
+              <a:duotone>
+                <a:schemeClr val="accent5">
+                  <a:shade val="45000"/>
+                  <a:satMod val="135000"/>
+                </a:schemeClr>
+                <a:prstClr val="white"/>
+              </a:duotone>
+            </a:blip>
+            <a:stretch>
+              <a:fillRect/>
+            </a:stretch>
+          </p:blipFill>
+          <p:spPr>
+            <a:xfrm>
+              <a:off x="132768" y="3399582"/>
+              <a:ext cx="649144" cy="649144"/>
+            </a:xfrm>
+            <a:prstGeom prst="rect">
+              <a:avLst/>
+            </a:prstGeom>
+          </p:spPr>
+        </p:pic>
+        <p:sp>
+          <p:nvSpPr>
+            <p:cNvPr id="1039" name="TextBox 1038">
+              <a:extLst>
+                <a:ext uri="{FF2B5EF4-FFF2-40B4-BE49-F238E27FC236}">
+                  <a16:creationId xmlns:a16="http://schemas.microsoft.com/office/drawing/2014/main" id="{0DC3208C-9DE0-47D2-AD7F-A1EA999BEC34}"/>
+                </a:ext>
+              </a:extLst>
+            </p:cNvPr>
+            <p:cNvSpPr txBox="1"/>
+            <p:nvPr/>
+          </p:nvSpPr>
+          <p:spPr>
+            <a:xfrm>
+              <a:off x="1545497" y="1789462"/>
+              <a:ext cx="2123272" cy="1138773"/>
+            </a:xfrm>
+            <a:prstGeom prst="rect">
+              <a:avLst/>
+            </a:prstGeom>
+          </p:spPr>
+          <p:txBody>
+            <a:bodyPr wrap="square" rtlCol="0">
+              <a:spAutoFit/>
+            </a:bodyPr>
+            <a:lstStyle/>
+            <a:p>
+              <a:r>
+                <a:rPr lang="en-US" sz="1700" b="1" dirty="0">
+                  <a:solidFill>
+                    <a:schemeClr val="bg1"/>
+                  </a:solidFill>
+                </a:rPr>
+                <a:t>Case Examples</a:t>
+              </a:r>
+            </a:p>
+            <a:p>
+              <a:r>
+                <a:rPr lang="en-US" sz="1700" b="1" dirty="0">
+                  <a:solidFill>
+                    <a:schemeClr val="bg1"/>
+                  </a:solidFill>
+                </a:rPr>
+                <a:t>Paper Forms</a:t>
+              </a:r>
+            </a:p>
+            <a:p>
+              <a:r>
+                <a:rPr lang="en-US" sz="1700" b="1" dirty="0">
+                  <a:solidFill>
+                    <a:schemeClr val="bg1"/>
+                  </a:solidFill>
+                </a:rPr>
+                <a:t>User Stories</a:t>
+              </a:r>
+            </a:p>
+            <a:p>
+              <a:r>
+                <a:rPr lang="en-US" sz="1700" b="1" dirty="0">
+                  <a:solidFill>
+                    <a:schemeClr val="bg1"/>
+                  </a:solidFill>
+                </a:rPr>
+                <a:t>Personas</a:t>
+              </a:r>
+            </a:p>
+          </p:txBody>
+        </p:sp>
+        <p:sp>
+          <p:nvSpPr>
+            <p:cNvPr id="48" name="TextBox 47">
+              <a:extLst>
+                <a:ext uri="{FF2B5EF4-FFF2-40B4-BE49-F238E27FC236}">
+                  <a16:creationId xmlns:a16="http://schemas.microsoft.com/office/drawing/2014/main" id="{DDAE64A5-04AD-4585-8982-C63FC3879B0C}"/>
+                </a:ext>
+              </a:extLst>
+            </p:cNvPr>
+            <p:cNvSpPr txBox="1"/>
+            <p:nvPr/>
+          </p:nvSpPr>
+          <p:spPr>
+            <a:xfrm>
+              <a:off x="1545497" y="3285057"/>
+              <a:ext cx="2301859" cy="1138773"/>
+            </a:xfrm>
+            <a:prstGeom prst="rect">
+              <a:avLst/>
+            </a:prstGeom>
+          </p:spPr>
+          <p:txBody>
+            <a:bodyPr wrap="square" rtlCol="0">
+              <a:spAutoFit/>
+            </a:bodyPr>
+            <a:lstStyle/>
+            <a:p>
+              <a:r>
+                <a:rPr lang="en-US" sz="1700" b="1" dirty="0">
+                  <a:solidFill>
+                    <a:schemeClr val="bg1"/>
+                  </a:solidFill>
+                </a:rPr>
+                <a:t>Guideline narrative</a:t>
+              </a:r>
+            </a:p>
+            <a:p>
+              <a:r>
+                <a:rPr lang="en-US" sz="1700" b="1" dirty="0">
+                  <a:solidFill>
+                    <a:schemeClr val="bg1"/>
+                  </a:solidFill>
+                </a:rPr>
+                <a:t>Evidence Summaries</a:t>
+              </a:r>
+            </a:p>
+            <a:p>
+              <a:r>
+                <a:rPr lang="en-US" sz="1700" b="1" dirty="0">
+                  <a:solidFill>
+                    <a:schemeClr val="bg1"/>
+                  </a:solidFill>
+                </a:rPr>
+                <a:t>Tables &amp; Figures</a:t>
+              </a:r>
+            </a:p>
+            <a:p>
+              <a:endParaRPr lang="en-US" sz="1700" b="1" dirty="0">
+                <a:solidFill>
+                  <a:schemeClr val="bg1"/>
+                </a:solidFill>
+              </a:endParaRPr>
+            </a:p>
+          </p:txBody>
+        </p:sp>
+        <p:sp>
+          <p:nvSpPr>
+            <p:cNvPr id="49" name="TextBox 48">
+              <a:extLst>
+                <a:ext uri="{FF2B5EF4-FFF2-40B4-BE49-F238E27FC236}">
+                  <a16:creationId xmlns:a16="http://schemas.microsoft.com/office/drawing/2014/main" id="{6A2FDFAF-3EF4-4684-BD5E-F848F994EE36}"/>
+                </a:ext>
+              </a:extLst>
+            </p:cNvPr>
+            <p:cNvSpPr txBox="1"/>
+            <p:nvPr/>
+          </p:nvSpPr>
+          <p:spPr>
+            <a:xfrm>
+              <a:off x="1545497" y="4736234"/>
+              <a:ext cx="2375556" cy="877163"/>
+            </a:xfrm>
+            <a:prstGeom prst="rect">
+              <a:avLst/>
+            </a:prstGeom>
+          </p:spPr>
+          <p:txBody>
+            <a:bodyPr wrap="square" rtlCol="0">
+              <a:spAutoFit/>
+            </a:bodyPr>
+            <a:lstStyle/>
+            <a:p>
+              <a:r>
+                <a:rPr lang="en-US" sz="1700" b="1" dirty="0">
+                  <a:solidFill>
+                    <a:schemeClr val="bg1"/>
+                  </a:solidFill>
+                </a:rPr>
+                <a:t>Glossaries</a:t>
+              </a:r>
+            </a:p>
+            <a:p>
+              <a:r>
+                <a:rPr lang="en-US" sz="1700" b="1" dirty="0">
+                  <a:solidFill>
+                    <a:schemeClr val="bg1"/>
+                  </a:solidFill>
+                </a:rPr>
+                <a:t>Domain Concepts</a:t>
+              </a:r>
+            </a:p>
+            <a:p>
+              <a:r>
+                <a:rPr lang="en-US" sz="1700" b="1" dirty="0">
+                  <a:solidFill>
+                    <a:schemeClr val="bg1"/>
+                  </a:solidFill>
+                </a:rPr>
+                <a:t>Indicator descriptions</a:t>
+              </a:r>
+            </a:p>
+          </p:txBody>
+        </p:sp>
+        <p:sp>
+          <p:nvSpPr>
+            <p:cNvPr id="50" name="TextBox 49">
+              <a:extLst>
+                <a:ext uri="{FF2B5EF4-FFF2-40B4-BE49-F238E27FC236}">
+                  <a16:creationId xmlns:a16="http://schemas.microsoft.com/office/drawing/2014/main" id="{306C5D6E-5DE6-4995-845F-0A4DB522824E}"/>
+                </a:ext>
+              </a:extLst>
+            </p:cNvPr>
+            <p:cNvSpPr txBox="1"/>
+            <p:nvPr/>
+          </p:nvSpPr>
+          <p:spPr>
+            <a:xfrm>
+              <a:off x="4229411" y="1956328"/>
+              <a:ext cx="2123272" cy="615553"/>
+            </a:xfrm>
+            <a:prstGeom prst="rect">
+              <a:avLst/>
+            </a:prstGeom>
+          </p:spPr>
+          <p:txBody>
+            <a:bodyPr wrap="square" rtlCol="0">
+              <a:spAutoFit/>
+            </a:bodyPr>
+            <a:lstStyle/>
+            <a:p>
+              <a:r>
+                <a:rPr lang="en-US" sz="1700" b="1" dirty="0">
+                  <a:solidFill>
+                    <a:schemeClr val="bg1"/>
+                  </a:solidFill>
+                </a:rPr>
+                <a:t>Wire Frames</a:t>
+              </a:r>
+            </a:p>
+            <a:p>
+              <a:r>
+                <a:rPr lang="en-US" sz="1700" b="1" dirty="0">
+                  <a:solidFill>
+                    <a:schemeClr val="bg1"/>
+                  </a:solidFill>
+                </a:rPr>
+                <a:t>Flow Diagrams</a:t>
+              </a:r>
+            </a:p>
+          </p:txBody>
+        </p:sp>
+        <p:sp>
+          <p:nvSpPr>
+            <p:cNvPr id="51" name="TextBox 50">
+              <a:extLst>
+                <a:ext uri="{FF2B5EF4-FFF2-40B4-BE49-F238E27FC236}">
+                  <a16:creationId xmlns:a16="http://schemas.microsoft.com/office/drawing/2014/main" id="{9476C5CE-59F2-46F3-BDC1-A2D009B52043}"/>
+                </a:ext>
+              </a:extLst>
+            </p:cNvPr>
+            <p:cNvSpPr txBox="1"/>
+            <p:nvPr/>
+          </p:nvSpPr>
+          <p:spPr>
+            <a:xfrm>
+              <a:off x="6863677" y="2015233"/>
+              <a:ext cx="2123272" cy="615553"/>
+            </a:xfrm>
+            <a:prstGeom prst="rect">
+              <a:avLst/>
+            </a:prstGeom>
+          </p:spPr>
+          <p:txBody>
+            <a:bodyPr wrap="square" rtlCol="0">
+              <a:spAutoFit/>
+            </a:bodyPr>
+            <a:lstStyle/>
+            <a:p>
+              <a:r>
+                <a:rPr lang="en-US" sz="1700" b="1" dirty="0">
+                  <a:solidFill>
+                    <a:schemeClr val="bg1"/>
+                  </a:solidFill>
+                </a:rPr>
+                <a:t>Questionnaire</a:t>
+              </a:r>
+            </a:p>
+            <a:p>
+              <a:r>
+                <a:rPr lang="en-US" sz="1700" b="1" dirty="0">
+                  <a:solidFill>
+                    <a:schemeClr val="bg1"/>
+                  </a:solidFill>
+                </a:rPr>
+                <a:t>Adaptive Form (SDC)</a:t>
+              </a:r>
+            </a:p>
+          </p:txBody>
+        </p:sp>
+        <p:sp>
+          <p:nvSpPr>
+            <p:cNvPr id="52" name="TextBox 51">
+              <a:extLst>
+                <a:ext uri="{FF2B5EF4-FFF2-40B4-BE49-F238E27FC236}">
+                  <a16:creationId xmlns:a16="http://schemas.microsoft.com/office/drawing/2014/main" id="{E8998884-432F-4A55-AA60-FC5EF1710B3D}"/>
+                </a:ext>
+              </a:extLst>
+            </p:cNvPr>
+            <p:cNvSpPr txBox="1"/>
+            <p:nvPr/>
+          </p:nvSpPr>
+          <p:spPr>
+            <a:xfrm>
+              <a:off x="9497940" y="1748517"/>
+              <a:ext cx="2123272" cy="877163"/>
+            </a:xfrm>
+            <a:prstGeom prst="rect">
+              <a:avLst/>
+            </a:prstGeom>
+          </p:spPr>
+          <p:txBody>
+            <a:bodyPr wrap="square" rtlCol="0">
+              <a:spAutoFit/>
+            </a:bodyPr>
+            <a:lstStyle/>
+            <a:p>
+              <a:r>
+                <a:rPr lang="en-US" sz="1700" b="1" dirty="0">
+                  <a:solidFill>
+                    <a:schemeClr val="bg1"/>
+                  </a:solidFill>
+                </a:rPr>
+                <a:t>User-interface Forms</a:t>
+              </a:r>
+            </a:p>
+            <a:p>
+              <a:r>
+                <a:rPr lang="en-US" sz="1700" b="1" dirty="0">
+                  <a:solidFill>
+                    <a:schemeClr val="bg1"/>
+                  </a:solidFill>
+                </a:rPr>
+                <a:t>Visualizations</a:t>
+              </a:r>
+            </a:p>
+            <a:p>
+              <a:r>
+                <a:rPr lang="en-US" sz="1700" b="1" dirty="0">
+                  <a:solidFill>
+                    <a:schemeClr val="bg1"/>
+                  </a:solidFill>
+                </a:rPr>
+                <a:t>Interaction Model</a:t>
+              </a:r>
+            </a:p>
+          </p:txBody>
+        </p:sp>
+        <p:sp>
+          <p:nvSpPr>
+            <p:cNvPr id="53" name="TextBox 52">
+              <a:extLst>
+                <a:ext uri="{FF2B5EF4-FFF2-40B4-BE49-F238E27FC236}">
+                  <a16:creationId xmlns:a16="http://schemas.microsoft.com/office/drawing/2014/main" id="{5D1001D2-96A6-4483-9741-59779A75D925}"/>
+                </a:ext>
+              </a:extLst>
+            </p:cNvPr>
+            <p:cNvSpPr txBox="1"/>
+            <p:nvPr/>
+          </p:nvSpPr>
+          <p:spPr>
+            <a:xfrm>
+              <a:off x="4229411" y="3083424"/>
+              <a:ext cx="2123272" cy="1400383"/>
+            </a:xfrm>
+            <a:prstGeom prst="rect">
+              <a:avLst/>
+            </a:prstGeom>
+          </p:spPr>
+          <p:txBody>
+            <a:bodyPr wrap="square" rtlCol="0">
+              <a:spAutoFit/>
+            </a:bodyPr>
+            <a:lstStyle/>
+            <a:p>
+              <a:r>
+                <a:rPr lang="en-US" sz="1700" b="1" dirty="0">
+                  <a:solidFill>
+                    <a:schemeClr val="bg1"/>
+                  </a:solidFill>
+                </a:rPr>
+                <a:t>Workflows</a:t>
+              </a:r>
+            </a:p>
+            <a:p>
+              <a:pPr indent="-243834"/>
+              <a:r>
+                <a:rPr lang="en-US" sz="1700" b="1" dirty="0">
+                  <a:solidFill>
+                    <a:schemeClr val="bg1"/>
+                  </a:solidFill>
+                </a:rPr>
+                <a:t>Decision Trees, Tables, and Flows</a:t>
+              </a:r>
+            </a:p>
+            <a:p>
+              <a:r>
+                <a:rPr lang="en-US" sz="1700" b="1" dirty="0">
+                  <a:solidFill>
+                    <a:schemeClr val="bg1"/>
+                  </a:solidFill>
+                </a:rPr>
+                <a:t>Triggers</a:t>
+              </a:r>
+            </a:p>
+            <a:p>
+              <a:r>
+                <a:rPr lang="en-US" sz="1700" b="1" dirty="0">
+                  <a:solidFill>
+                    <a:schemeClr val="bg1"/>
+                  </a:solidFill>
+                </a:rPr>
+                <a:t>Concept Maps</a:t>
+              </a:r>
+            </a:p>
+          </p:txBody>
+        </p:sp>
+        <p:sp>
+          <p:nvSpPr>
+            <p:cNvPr id="54" name="TextBox 53">
+              <a:extLst>
+                <a:ext uri="{FF2B5EF4-FFF2-40B4-BE49-F238E27FC236}">
+                  <a16:creationId xmlns:a16="http://schemas.microsoft.com/office/drawing/2014/main" id="{AE563D0A-7D50-4DCE-A50F-357C2328E7E5}"/>
+                </a:ext>
+              </a:extLst>
+            </p:cNvPr>
+            <p:cNvSpPr txBox="1"/>
+            <p:nvPr/>
+          </p:nvSpPr>
+          <p:spPr>
+            <a:xfrm>
+              <a:off x="4229411" y="4695706"/>
+              <a:ext cx="2123272" cy="877163"/>
+            </a:xfrm>
+            <a:prstGeom prst="rect">
+              <a:avLst/>
+            </a:prstGeom>
+          </p:spPr>
+          <p:txBody>
+            <a:bodyPr wrap="square" rtlCol="0">
+              <a:spAutoFit/>
+            </a:bodyPr>
+            <a:lstStyle/>
+            <a:p>
+              <a:r>
+                <a:rPr lang="en-US" sz="1700" b="1" dirty="0">
+                  <a:solidFill>
+                    <a:schemeClr val="bg1"/>
+                  </a:solidFill>
+                </a:rPr>
+                <a:t>Terminologies</a:t>
+              </a:r>
+            </a:p>
+            <a:p>
+              <a:r>
+                <a:rPr lang="en-US" sz="1700" b="1" dirty="0">
+                  <a:solidFill>
+                    <a:schemeClr val="bg1"/>
+                  </a:solidFill>
+                </a:rPr>
+                <a:t>Data Dictionary</a:t>
+              </a:r>
+            </a:p>
+            <a:p>
+              <a:r>
+                <a:rPr lang="en-US" sz="1700" b="1" dirty="0">
+                  <a:solidFill>
+                    <a:schemeClr val="bg1"/>
+                  </a:solidFill>
+                </a:rPr>
+                <a:t>Indicators</a:t>
+              </a:r>
+            </a:p>
+          </p:txBody>
+        </p:sp>
+        <p:sp>
+          <p:nvSpPr>
+            <p:cNvPr id="55" name="TextBox 54">
+              <a:extLst>
+                <a:ext uri="{FF2B5EF4-FFF2-40B4-BE49-F238E27FC236}">
+                  <a16:creationId xmlns:a16="http://schemas.microsoft.com/office/drawing/2014/main" id="{4FE9EC94-A3A9-4C68-A926-AA73FD2622E7}"/>
+                </a:ext>
+              </a:extLst>
+            </p:cNvPr>
+            <p:cNvSpPr txBox="1"/>
+            <p:nvPr/>
+          </p:nvSpPr>
+          <p:spPr>
+            <a:xfrm>
+              <a:off x="6863675" y="3190621"/>
+              <a:ext cx="2325908" cy="1138773"/>
+            </a:xfrm>
+            <a:prstGeom prst="rect">
+              <a:avLst/>
+            </a:prstGeom>
+          </p:spPr>
+          <p:txBody>
+            <a:bodyPr wrap="square" rIns="0" rtlCol="0">
+              <a:spAutoFit/>
+            </a:bodyPr>
+            <a:lstStyle/>
+            <a:p>
+              <a:r>
+                <a:rPr lang="en-US" sz="1700" b="1" dirty="0">
+                  <a:solidFill>
+                    <a:schemeClr val="bg1"/>
+                  </a:solidFill>
+                </a:rPr>
+                <a:t>Library (CQL)</a:t>
+              </a:r>
+            </a:p>
+            <a:p>
+              <a:r>
+                <a:rPr lang="en-US" sz="1700" b="1" dirty="0">
+                  <a:solidFill>
+                    <a:schemeClr val="bg1"/>
+                  </a:solidFill>
+                </a:rPr>
+                <a:t>ActivityDefinition</a:t>
+              </a:r>
+            </a:p>
+            <a:p>
+              <a:r>
+                <a:rPr lang="en-US" sz="1700" b="1" dirty="0">
+                  <a:solidFill>
+                    <a:schemeClr val="bg1"/>
+                  </a:solidFill>
+                </a:rPr>
+                <a:t>PlanDefinition</a:t>
+              </a:r>
+            </a:p>
+            <a:p>
+              <a:r>
+                <a:rPr lang="en-US" sz="1700" b="1" dirty="0">
+                  <a:solidFill>
+                    <a:schemeClr val="bg1"/>
+                  </a:solidFill>
+                </a:rPr>
+                <a:t>Inferred CaseFeatures</a:t>
+              </a:r>
+            </a:p>
+          </p:txBody>
+        </p:sp>
+        <p:sp>
+          <p:nvSpPr>
+            <p:cNvPr id="56" name="TextBox 55">
+              <a:extLst>
+                <a:ext uri="{FF2B5EF4-FFF2-40B4-BE49-F238E27FC236}">
+                  <a16:creationId xmlns:a16="http://schemas.microsoft.com/office/drawing/2014/main" id="{7EA290DC-F222-4457-BCDF-B9C1C03257E4}"/>
+                </a:ext>
+              </a:extLst>
+            </p:cNvPr>
+            <p:cNvSpPr txBox="1"/>
+            <p:nvPr/>
+          </p:nvSpPr>
+          <p:spPr>
+            <a:xfrm>
+              <a:off x="6863679" y="4642458"/>
+              <a:ext cx="2252210" cy="1138773"/>
+            </a:xfrm>
+            <a:prstGeom prst="rect">
+              <a:avLst/>
+            </a:prstGeom>
+          </p:spPr>
+          <p:txBody>
+            <a:bodyPr wrap="square" rtlCol="0">
+              <a:spAutoFit/>
+            </a:bodyPr>
+            <a:lstStyle/>
+            <a:p>
+              <a:r>
+                <a:rPr lang="en-US" sz="1700" b="1" dirty="0">
+                  <a:solidFill>
+                    <a:schemeClr val="bg1"/>
+                  </a:solidFill>
+                </a:rPr>
+                <a:t>CodeSystem</a:t>
+              </a:r>
+            </a:p>
+            <a:p>
+              <a:r>
+                <a:rPr lang="en-US" sz="1700" b="1" dirty="0">
+                  <a:solidFill>
+                    <a:schemeClr val="bg1"/>
+                  </a:solidFill>
+                </a:rPr>
+                <a:t>ValueSet</a:t>
+              </a:r>
+            </a:p>
+            <a:p>
+              <a:r>
+                <a:rPr lang="en-US" sz="1700" b="1" dirty="0">
+                  <a:solidFill>
+                    <a:schemeClr val="bg1"/>
+                  </a:solidFill>
+                </a:rPr>
+                <a:t>StructureDefinition</a:t>
+              </a:r>
+            </a:p>
+            <a:p>
+              <a:r>
+                <a:rPr lang="en-US" sz="1700" b="1" dirty="0">
+                  <a:solidFill>
+                    <a:schemeClr val="bg1"/>
+                  </a:solidFill>
+                </a:rPr>
+                <a:t>Data Requirements</a:t>
+              </a:r>
+            </a:p>
+          </p:txBody>
+        </p:sp>
+        <p:sp>
+          <p:nvSpPr>
+            <p:cNvPr id="57" name="TextBox 56">
+              <a:extLst>
+                <a:ext uri="{FF2B5EF4-FFF2-40B4-BE49-F238E27FC236}">
+                  <a16:creationId xmlns:a16="http://schemas.microsoft.com/office/drawing/2014/main" id="{2D9854AD-C545-4EAE-89C1-A43E693DD00A}"/>
+                </a:ext>
+              </a:extLst>
+            </p:cNvPr>
+            <p:cNvSpPr txBox="1"/>
+            <p:nvPr/>
+          </p:nvSpPr>
+          <p:spPr>
+            <a:xfrm>
+              <a:off x="9497940" y="3006403"/>
+              <a:ext cx="2123272" cy="1400383"/>
+            </a:xfrm>
+            <a:prstGeom prst="rect">
+              <a:avLst/>
+            </a:prstGeom>
+          </p:spPr>
+          <p:txBody>
+            <a:bodyPr wrap="square" rtlCol="0">
+              <a:spAutoFit/>
+            </a:bodyPr>
+            <a:lstStyle/>
+            <a:p>
+              <a:r>
+                <a:rPr lang="en-US" sz="1700" b="1" dirty="0">
+                  <a:solidFill>
+                    <a:schemeClr val="bg1"/>
+                  </a:solidFill>
+                </a:rPr>
+                <a:t>Application Services</a:t>
+              </a:r>
+            </a:p>
+            <a:p>
+              <a:r>
+                <a:rPr lang="en-US" sz="1700" b="1" dirty="0">
+                  <a:solidFill>
+                    <a:schemeClr val="bg1"/>
+                  </a:solidFill>
+                </a:rPr>
+                <a:t>Health Record Systems</a:t>
+              </a:r>
+            </a:p>
+            <a:p>
+              <a:r>
+                <a:rPr lang="en-US" sz="1700" b="1" dirty="0">
+                  <a:solidFill>
+                    <a:schemeClr val="bg1"/>
+                  </a:solidFill>
+                </a:rPr>
+                <a:t>Decision Services</a:t>
+              </a:r>
+            </a:p>
+            <a:p>
+              <a:r>
+                <a:rPr lang="en-US" sz="1700" b="1" dirty="0">
+                  <a:solidFill>
+                    <a:schemeClr val="bg1"/>
+                  </a:solidFill>
+                </a:rPr>
+                <a:t>Rules Engine</a:t>
+              </a:r>
+            </a:p>
+          </p:txBody>
+        </p:sp>
+        <p:sp>
+          <p:nvSpPr>
+            <p:cNvPr id="58" name="TextBox 57">
+              <a:extLst>
+                <a:ext uri="{FF2B5EF4-FFF2-40B4-BE49-F238E27FC236}">
+                  <a16:creationId xmlns:a16="http://schemas.microsoft.com/office/drawing/2014/main" id="{2B5A81BB-EDBE-41CC-9EBA-617B62618793}"/>
+                </a:ext>
+              </a:extLst>
+            </p:cNvPr>
+            <p:cNvSpPr txBox="1"/>
+            <p:nvPr/>
+          </p:nvSpPr>
+          <p:spPr>
+            <a:xfrm>
+              <a:off x="9497941" y="4642458"/>
+              <a:ext cx="2252210" cy="1138773"/>
+            </a:xfrm>
+            <a:prstGeom prst="rect">
+              <a:avLst/>
+            </a:prstGeom>
+          </p:spPr>
+          <p:txBody>
+            <a:bodyPr wrap="square" rtlCol="0">
+              <a:spAutoFit/>
+            </a:bodyPr>
+            <a:lstStyle/>
+            <a:p>
+              <a:r>
+                <a:rPr lang="en-US" sz="1700" b="1" dirty="0">
+                  <a:solidFill>
+                    <a:schemeClr val="bg1"/>
+                  </a:solidFill>
+                </a:rPr>
+                <a:t>Systems of Record</a:t>
+              </a:r>
+            </a:p>
+            <a:p>
+              <a:r>
+                <a:rPr lang="en-US" sz="1700" b="1" dirty="0">
+                  <a:solidFill>
+                    <a:schemeClr val="bg1"/>
+                  </a:solidFill>
+                </a:rPr>
+                <a:t>Registries &amp; Exchanges</a:t>
+              </a:r>
+            </a:p>
+            <a:p>
+              <a:r>
+                <a:rPr lang="en-US" sz="1700" b="1" dirty="0">
+                  <a:solidFill>
+                    <a:schemeClr val="bg1"/>
+                  </a:solidFill>
+                </a:rPr>
+                <a:t>Data Services</a:t>
+              </a:r>
+            </a:p>
+            <a:p>
+              <a:r>
+                <a:rPr lang="en-US" sz="1700" b="1" dirty="0">
+                  <a:solidFill>
+                    <a:schemeClr val="bg1"/>
+                  </a:solidFill>
+                </a:rPr>
+                <a:t>Data Warehouse</a:t>
+              </a:r>
+            </a:p>
+          </p:txBody>
+        </p:sp>
+      </p:grpSp>
+      <p:sp>
+        <p:nvSpPr>
+          <p:cNvPr id="33" name="Title 1">
+            <a:extLst>
+              <a:ext uri="{FF2B5EF4-FFF2-40B4-BE49-F238E27FC236}">
+                <a16:creationId xmlns:a16="http://schemas.microsoft.com/office/drawing/2014/main" id="{1CC1E63E-43F6-4391-BF27-C6B19120068A}"/>
+              </a:ext>
+            </a:extLst>
+          </p:cNvPr>
+          <p:cNvSpPr txBox="1">
+            <a:spLocks/>
+          </p:cNvSpPr>
+          <p:nvPr/>
+        </p:nvSpPr>
+        <p:spPr>
+          <a:xfrm>
+            <a:off x="241447" y="243877"/>
+            <a:ext cx="11709106" cy="1325563"/>
+          </a:xfrm>
+          <a:prstGeom prst="rect">
+            <a:avLst/>
+          </a:prstGeom>
+        </p:spPr>
+        <p:txBody>
+          <a:bodyPr>
+            <a:normAutofit/>
+          </a:bodyPr>
+          <a:lstStyle>
+            <a:lvl1pPr algn="l" defTabSz="914400" rtl="0" eaLnBrk="1" latinLnBrk="0" hangingPunct="1">
+              <a:lnSpc>
+                <a:spcPct val="90000"/>
+              </a:lnSpc>
+              <a:spcBef>
+                <a:spcPct val="0"/>
+              </a:spcBef>
+              <a:buNone/>
+              <a:defRPr sz="4400" kern="1200">
+                <a:solidFill>
+                  <a:schemeClr val="tx1"/>
+                </a:solidFill>
+                <a:latin typeface="+mj-lt"/>
+                <a:ea typeface="+mj-ea"/>
+                <a:cs typeface="+mj-cs"/>
+              </a:defRPr>
+            </a:lvl1pPr>
+          </a:lstStyle>
+          <a:p>
+            <a:pPr algn="ctr"/>
+            <a:r>
+              <a:rPr lang="en-US" b="1" dirty="0"/>
+              <a:t>Levels of Representation x Tiers of Functionality</a:t>
+            </a:r>
+            <a:endParaRPr lang="en-US" dirty="0"/>
+          </a:p>
+        </p:txBody>
+      </p:sp>
+      <p:sp>
+        <p:nvSpPr>
+          <p:cNvPr id="4" name="Rectangle 3">
+            <a:extLst>
+              <a:ext uri="{FF2B5EF4-FFF2-40B4-BE49-F238E27FC236}">
+                <a16:creationId xmlns:a16="http://schemas.microsoft.com/office/drawing/2014/main" id="{5C012114-6176-4D15-A42A-CD601B9B5FE3}"/>
+              </a:ext>
+            </a:extLst>
+          </p:cNvPr>
+          <p:cNvSpPr/>
+          <p:nvPr/>
+        </p:nvSpPr>
+        <p:spPr>
+          <a:xfrm>
+            <a:off x="353057" y="5891847"/>
+            <a:ext cx="11897884" cy="892552"/>
+          </a:xfrm>
+          <a:prstGeom prst="rect">
+            <a:avLst/>
+          </a:prstGeom>
+        </p:spPr>
+        <p:txBody>
+          <a:bodyPr wrap="square">
+            <a:spAutoFit/>
+          </a:bodyPr>
+          <a:lstStyle/>
+          <a:p>
+            <a:r>
+              <a:rPr lang="en-US" sz="1400" dirty="0"/>
+              <a:t>“We have developed a </a:t>
+            </a:r>
+            <a:r>
+              <a:rPr lang="en-US" sz="1400" b="1" dirty="0"/>
+              <a:t>multi-layered knowledge representation framework </a:t>
+            </a:r>
+            <a:r>
+              <a:rPr lang="en-US" sz="1400" dirty="0"/>
+              <a:t>for structuring guideline recommendations for implementation in a variety of CDS contexts.” </a:t>
+            </a:r>
+            <a:r>
+              <a:rPr lang="en-US" sz="1200" dirty="0" err="1"/>
+              <a:t>Boxwala</a:t>
+            </a:r>
+            <a:r>
+              <a:rPr lang="en-US" sz="1200" dirty="0"/>
+              <a:t>, A. A., Rocha, B. H., </a:t>
+            </a:r>
+            <a:r>
+              <a:rPr lang="en-US" sz="1200" dirty="0" err="1"/>
+              <a:t>Maviglia</a:t>
+            </a:r>
+            <a:r>
+              <a:rPr lang="en-US" sz="1200" dirty="0"/>
+              <a:t>, S., Kashyap, V., Meltzer, S., Kim, J., </a:t>
+            </a:r>
+            <a:r>
+              <a:rPr lang="en-US" sz="1200" dirty="0" err="1"/>
+              <a:t>Tsurikova</a:t>
+            </a:r>
+            <a:r>
+              <a:rPr lang="en-US" sz="1200" dirty="0"/>
+              <a:t>, R., Wright, A., Paterno, M. D., Fairbanks, A., &amp; Middleton, B. (2011). A multi-layered framework for disseminating knowledge for computer-based decision support. </a:t>
+            </a:r>
+            <a:r>
+              <a:rPr lang="en-US" sz="1200" i="1" dirty="0"/>
+              <a:t>Journal of the American Medical Informatics Association : JAMIA</a:t>
+            </a:r>
+            <a:r>
+              <a:rPr lang="en-US" sz="1200" dirty="0"/>
+              <a:t>, </a:t>
+            </a:r>
+            <a:r>
+              <a:rPr lang="en-US" sz="1200" i="1" dirty="0"/>
+              <a:t>18 Suppl 1</a:t>
+            </a:r>
+            <a:r>
+              <a:rPr lang="en-US" sz="1200" dirty="0"/>
+              <a:t>(Suppl 1), i132–i139. </a:t>
+            </a:r>
+            <a:r>
+              <a:rPr lang="en-US" sz="1200" dirty="0">
+                <a:hlinkClick r:id="rId6"/>
+              </a:rPr>
+              <a:t>https://doi.org/10.1136/amiajnl-2011-000334</a:t>
+            </a:r>
+            <a:endParaRPr lang="en-US" sz="1200" dirty="0"/>
+          </a:p>
+        </p:txBody>
+      </p:sp>
+      <p:sp>
+        <p:nvSpPr>
+          <p:cNvPr id="2" name="TextBox 1">
+            <a:extLst>
+              <a:ext uri="{FF2B5EF4-FFF2-40B4-BE49-F238E27FC236}">
+                <a16:creationId xmlns:a16="http://schemas.microsoft.com/office/drawing/2014/main" id="{584FFADE-33BB-410D-BD6A-BAFB753D8F14}"/>
+              </a:ext>
+            </a:extLst>
+          </p:cNvPr>
+          <p:cNvSpPr txBox="1"/>
+          <p:nvPr/>
+        </p:nvSpPr>
+        <p:spPr>
+          <a:xfrm>
+            <a:off x="4112842" y="6507400"/>
+            <a:ext cx="7958782" cy="276999"/>
+          </a:xfrm>
+          <a:prstGeom prst="rect">
+            <a:avLst/>
+          </a:prstGeom>
+          <a:noFill/>
+        </p:spPr>
+        <p:txBody>
+          <a:bodyPr wrap="none" rtlCol="0">
+            <a:spAutoFit/>
+          </a:bodyPr>
+          <a:lstStyle/>
+          <a:p>
+            <a:r>
+              <a:rPr lang="en-US" sz="1200" dirty="0">
+                <a:hlinkClick r:id="rId7"/>
+              </a:rPr>
+              <a:t>http://build.fhir.org/ig/HL7/cqf-recommendations/documentation-approach-06-01-levels-of-knowledge-representation.html</a:t>
+            </a:r>
+            <a:endParaRPr lang="en-US" sz="1200" dirty="0"/>
+          </a:p>
+        </p:txBody>
+      </p:sp>
+    </p:spTree>
+    <p:extLst>
+      <p:ext uri="{BB962C8B-B14F-4D97-AF65-F5344CB8AC3E}">
+        <p14:creationId xmlns:p14="http://schemas.microsoft.com/office/powerpoint/2010/main" val="3963331121"/>
+      </p:ext>
+    </p:extLst>
+  </p:cSld>
+  <p:clrMapOvr>
+    <a:masterClrMapping/>
+  </p:clrMapOvr>
+  <p:timing>
+    <p:tnLst>
+      <p:par>
+        <p:cTn id="1" dur="indefinite" restart="never" nodeType="tmRoot">
+          <p:childTnLst>
+            <p:seq concurrent="1" nextAc="seek">
+              <p:cTn id="2" dur="indefinite" nodeType="mainSeq">
+                <p:childTnLst>
+                  <p:par>
+                    <p:cTn id="3" fill="hold">
+                      <p:stCondLst>
+                        <p:cond delay="indefinite"/>
+                      </p:stCondLst>
+                      <p:childTnLst>
+                        <p:par>
+                          <p:cTn id="4" fill="hold">
+                            <p:stCondLst>
+                              <p:cond delay="0"/>
+                            </p:stCondLst>
+                            <p:childTnLst>
+                              <p:par>
+                                <p:cTn id="5" presetID="10" presetClass="entr" presetSubtype="0" fill="hold" grpId="0" nodeType="clickEffect">
+                                  <p:stCondLst>
+                                    <p:cond delay="0"/>
+                                  </p:stCondLst>
+                                  <p:childTnLst>
+                                    <p:set>
+                                      <p:cBhvr>
+                                        <p:cTn id="6" dur="1" fill="hold">
+                                          <p:stCondLst>
+                                            <p:cond delay="0"/>
+                                          </p:stCondLst>
+                                        </p:cTn>
+                                        <p:tgtEl>
+                                          <p:spTgt spid="4"/>
+                                        </p:tgtEl>
+                                        <p:attrNameLst>
+                                          <p:attrName>style.visibility</p:attrName>
+                                        </p:attrNameLst>
+                                      </p:cBhvr>
+                                      <p:to>
+                                        <p:strVal val="visible"/>
+                                      </p:to>
+                                    </p:set>
+                                    <p:animEffect transition="in" filter="fade">
+                                      <p:cBhvr>
+                                        <p:cTn id="7" dur="500"/>
+                                        <p:tgtEl>
+                                          <p:spTgt spid="4"/>
+                                        </p:tgtEl>
+                                      </p:cBhvr>
+                                    </p:animEffect>
+                                  </p:childTnLst>
+                                </p:cTn>
+                              </p:par>
+                            </p:childTnLst>
+                          </p:cTn>
+                        </p:par>
+                      </p:childTnLst>
+                    </p:cTn>
+                  </p:par>
+                </p:childTnLst>
+              </p:cTn>
+              <p:prevCondLst>
+                <p:cond evt="onPrev" delay="0">
+                  <p:tgtEl>
+                    <p:sldTgt/>
+                  </p:tgtEl>
+                </p:cond>
+              </p:prevCondLst>
+              <p:nextCondLst>
+                <p:cond evt="onNext" delay="0">
+                  <p:tgtEl>
+                    <p:sldTgt/>
+                  </p:tgtEl>
+                </p:cond>
+              </p:nextCondLst>
+            </p:seq>
+          </p:childTnLst>
+        </p:cTn>
+      </p:par>
+    </p:tnLst>
+    <p:bldLst>
+      <p:bldP spid="4" grpId="0"/>
+    </p:bldLst>
+  </p:timing>
+</p:sld>
+</file>
+
+<file path=ppt/slides/slide9.xml><?xml version="1.0" encoding="utf-8"?>
+<p:sld xmlns:a="http://schemas.openxmlformats.org/drawingml/2006/main" xmlns:r="http://schemas.openxmlformats.org/officeDocument/2006/relationships" xmlns:p="http://schemas.openxmlformats.org/presentationml/2006/main">
+  <p:cSld>
+    <p:spTree>
+      <p:nvGrpSpPr>
+        <p:cNvPr id="1" name=""/>
+        <p:cNvGrpSpPr/>
+        <p:nvPr/>
+      </p:nvGrpSpPr>
+      <p:grpSpPr>
+        <a:xfrm>
+          <a:off x="0" y="0"/>
+          <a:ext cx="0" cy="0"/>
+          <a:chOff x="0" y="0"/>
+          <a:chExt cx="0" cy="0"/>
+        </a:xfrm>
+      </p:grpSpPr>
       <p:sp>
         <p:nvSpPr>
           <p:cNvPr id="2" name="Title 1">
@@ -18076,580 +20600,6 @@
         <p14:creationId xmlns:p14="http://schemas.microsoft.com/office/powerpoint/2010/main" val="1722197074"/>
       </p:ext>
     </p:extLst>
-  </p:cSld>
-  <p:clrMapOvr>
-    <a:masterClrMapping/>
-  </p:clrMapOvr>
-</p:sld>
-</file>
-
-<file path=ppt/slides/slide9.xml><?xml version="1.0" encoding="utf-8"?>
-<p:sld xmlns:a="http://schemas.openxmlformats.org/drawingml/2006/main" xmlns:r="http://schemas.openxmlformats.org/officeDocument/2006/relationships" xmlns:p="http://schemas.openxmlformats.org/presentationml/2006/main">
-  <p:cSld>
-    <p:spTree>
-      <p:nvGrpSpPr>
-        <p:cNvPr id="1" name=""/>
-        <p:cNvGrpSpPr/>
-        <p:nvPr/>
-      </p:nvGrpSpPr>
-      <p:grpSpPr>
-        <a:xfrm>
-          <a:off x="0" y="0"/>
-          <a:ext cx="0" cy="0"/>
-          <a:chOff x="0" y="0"/>
-          <a:chExt cx="0" cy="0"/>
-        </a:xfrm>
-      </p:grpSpPr>
-      <p:sp>
-        <p:nvSpPr>
-          <p:cNvPr id="26" name="Title 25"/>
-          <p:cNvSpPr>
-            <a:spLocks noGrp="1"/>
-          </p:cNvSpPr>
-          <p:nvPr>
-            <p:ph type="title"/>
-          </p:nvPr>
-        </p:nvSpPr>
-        <p:spPr/>
-        <p:txBody>
-          <a:bodyPr/>
-          <a:lstStyle/>
-          <a:p>
-            <a:r>
-              <a:rPr lang="en-CA" dirty="0"/>
-              <a:t>Common Processes</a:t>
-            </a:r>
-          </a:p>
-        </p:txBody>
-      </p:sp>
-      <p:sp>
-        <p:nvSpPr>
-          <p:cNvPr id="2" name="Slide Number Placeholder 1"/>
-          <p:cNvSpPr>
-            <a:spLocks noGrp="1"/>
-          </p:cNvSpPr>
-          <p:nvPr>
-            <p:ph type="sldNum" sz="quarter" idx="4294967295"/>
-          </p:nvPr>
-        </p:nvSpPr>
-        <p:spPr>
-          <a:xfrm>
-            <a:off x="8077200" y="6356351"/>
-            <a:ext cx="2133600" cy="365125"/>
-          </a:xfrm>
-          <a:prstGeom prst="rect">
-            <a:avLst/>
-          </a:prstGeom>
-        </p:spPr>
-        <p:txBody>
-          <a:bodyPr/>
-          <a:lstStyle/>
-          <a:p>
-            <a:fld id="{6734F48E-A456-4E2F-B17E-509464F7A050}" type="slidenum">
-              <a:rPr lang="en-CA" smtClean="0"/>
-              <a:pPr/>
-              <a:t>9</a:t>
-            </a:fld>
-            <a:endParaRPr lang="en-CA"/>
-          </a:p>
-        </p:txBody>
-      </p:sp>
-      <p:pic>
-        <p:nvPicPr>
-          <p:cNvPr id="20" name="Picture 5"/>
-          <p:cNvPicPr>
-            <a:picLocks noChangeAspect="1" noChangeArrowheads="1"/>
-          </p:cNvPicPr>
-          <p:nvPr/>
-        </p:nvPicPr>
-        <p:blipFill>
-          <a:blip r:embed="rId2" cstate="print"/>
-          <a:srcRect/>
-          <a:stretch>
-            <a:fillRect/>
-          </a:stretch>
-        </p:blipFill>
-        <p:spPr bwMode="auto">
-          <a:xfrm>
-            <a:off x="4876800" y="1471056"/>
-            <a:ext cx="1034886" cy="853514"/>
-          </a:xfrm>
-          <a:prstGeom prst="rect">
-            <a:avLst/>
-          </a:prstGeom>
-          <a:noFill/>
-          <a:ln w="9525">
-            <a:noFill/>
-            <a:miter lim="800000"/>
-            <a:headEnd/>
-            <a:tailEnd/>
-          </a:ln>
-          <a:effectLst/>
-        </p:spPr>
-      </p:pic>
-      <p:pic>
-        <p:nvPicPr>
-          <p:cNvPr id="21" name="Picture 6"/>
-          <p:cNvPicPr>
-            <a:picLocks noChangeAspect="1" noChangeArrowheads="1"/>
-          </p:cNvPicPr>
-          <p:nvPr/>
-        </p:nvPicPr>
-        <p:blipFill>
-          <a:blip r:embed="rId3" cstate="print"/>
-          <a:srcRect/>
-          <a:stretch>
-            <a:fillRect/>
-          </a:stretch>
-        </p:blipFill>
-        <p:spPr bwMode="auto">
-          <a:xfrm>
-            <a:off x="6477001" y="1758645"/>
-            <a:ext cx="813887" cy="862659"/>
-          </a:xfrm>
-          <a:prstGeom prst="rect">
-            <a:avLst/>
-          </a:prstGeom>
-          <a:noFill/>
-          <a:ln w="9525">
-            <a:noFill/>
-            <a:miter lim="800000"/>
-            <a:headEnd/>
-            <a:tailEnd/>
-          </a:ln>
-          <a:effectLst/>
-        </p:spPr>
-      </p:pic>
-      <p:pic>
-        <p:nvPicPr>
-          <p:cNvPr id="22" name="Picture 26"/>
-          <p:cNvPicPr>
-            <a:picLocks noChangeAspect="1" noChangeArrowheads="1"/>
-          </p:cNvPicPr>
-          <p:nvPr/>
-        </p:nvPicPr>
-        <p:blipFill>
-          <a:blip r:embed="rId4" cstate="print"/>
-          <a:srcRect/>
-          <a:stretch>
-            <a:fillRect/>
-          </a:stretch>
-        </p:blipFill>
-        <p:spPr bwMode="auto">
-          <a:xfrm>
-            <a:off x="2514601" y="2133601"/>
-            <a:ext cx="659949" cy="914479"/>
-          </a:xfrm>
-          <a:prstGeom prst="rect">
-            <a:avLst/>
-          </a:prstGeom>
-          <a:noFill/>
-          <a:ln w="9525">
-            <a:noFill/>
-            <a:miter lim="800000"/>
-            <a:headEnd/>
-            <a:tailEnd/>
-          </a:ln>
-          <a:effectLst/>
-        </p:spPr>
-      </p:pic>
-      <p:pic>
-        <p:nvPicPr>
-          <p:cNvPr id="24" name="Picture 28"/>
-          <p:cNvPicPr>
-            <a:picLocks noChangeAspect="1" noChangeArrowheads="1"/>
-          </p:cNvPicPr>
-          <p:nvPr/>
-        </p:nvPicPr>
-        <p:blipFill>
-          <a:blip r:embed="rId5" cstate="print"/>
-          <a:srcRect/>
-          <a:stretch>
-            <a:fillRect/>
-          </a:stretch>
-        </p:blipFill>
-        <p:spPr bwMode="auto">
-          <a:xfrm>
-            <a:off x="8382001" y="1530045"/>
-            <a:ext cx="934293" cy="768163"/>
-          </a:xfrm>
-          <a:prstGeom prst="rect">
-            <a:avLst/>
-          </a:prstGeom>
-          <a:noFill/>
-          <a:ln w="9525">
-            <a:noFill/>
-            <a:miter lim="800000"/>
-            <a:headEnd/>
-            <a:tailEnd/>
-          </a:ln>
-          <a:effectLst/>
-        </p:spPr>
-      </p:pic>
-      <p:pic>
-        <p:nvPicPr>
-          <p:cNvPr id="25" name="Picture 4"/>
-          <p:cNvPicPr>
-            <a:picLocks noChangeAspect="1" noChangeArrowheads="1"/>
-          </p:cNvPicPr>
-          <p:nvPr/>
-        </p:nvPicPr>
-        <p:blipFill>
-          <a:blip r:embed="rId6" cstate="print"/>
-          <a:srcRect/>
-          <a:stretch>
-            <a:fillRect/>
-          </a:stretch>
-        </p:blipFill>
-        <p:spPr bwMode="auto">
-          <a:xfrm>
-            <a:off x="3733801" y="2767390"/>
-            <a:ext cx="745301" cy="914479"/>
-          </a:xfrm>
-          <a:prstGeom prst="rect">
-            <a:avLst/>
-          </a:prstGeom>
-          <a:noFill/>
-          <a:ln w="9525">
-            <a:noFill/>
-            <a:miter lim="800000"/>
-            <a:headEnd/>
-            <a:tailEnd/>
-          </a:ln>
-          <a:effectLst/>
-        </p:spPr>
-      </p:pic>
-      <p:pic>
-        <p:nvPicPr>
-          <p:cNvPr id="28" name="Picture 5"/>
-          <p:cNvPicPr>
-            <a:picLocks noChangeAspect="1" noChangeArrowheads="1"/>
-          </p:cNvPicPr>
-          <p:nvPr/>
-        </p:nvPicPr>
-        <p:blipFill>
-          <a:blip r:embed="rId7" cstate="print"/>
-          <a:srcRect/>
-          <a:stretch>
-            <a:fillRect/>
-          </a:stretch>
-        </p:blipFill>
-        <p:spPr bwMode="auto">
-          <a:xfrm>
-            <a:off x="9178976" y="2814624"/>
-            <a:ext cx="879424" cy="882473"/>
-          </a:xfrm>
-          <a:prstGeom prst="rect">
-            <a:avLst/>
-          </a:prstGeom>
-          <a:noFill/>
-          <a:ln w="9525">
-            <a:noFill/>
-            <a:miter lim="800000"/>
-            <a:headEnd/>
-            <a:tailEnd/>
-          </a:ln>
-          <a:effectLst/>
-        </p:spPr>
-      </p:pic>
-      <p:pic>
-        <p:nvPicPr>
-          <p:cNvPr id="29" name="Picture 6"/>
-          <p:cNvPicPr>
-            <a:picLocks noChangeAspect="1" noChangeArrowheads="1"/>
-          </p:cNvPicPr>
-          <p:nvPr/>
-        </p:nvPicPr>
-        <p:blipFill>
-          <a:blip r:embed="rId8" cstate="print"/>
-          <a:srcRect/>
-          <a:stretch>
-            <a:fillRect/>
-          </a:stretch>
-        </p:blipFill>
-        <p:spPr bwMode="auto">
-          <a:xfrm>
-            <a:off x="2590800" y="3739844"/>
-            <a:ext cx="626418" cy="900762"/>
-          </a:xfrm>
-          <a:prstGeom prst="rect">
-            <a:avLst/>
-          </a:prstGeom>
-          <a:noFill/>
-          <a:ln w="9525">
-            <a:noFill/>
-            <a:miter lim="800000"/>
-            <a:headEnd/>
-            <a:tailEnd/>
-          </a:ln>
-          <a:effectLst/>
-        </p:spPr>
-      </p:pic>
-      <p:pic>
-        <p:nvPicPr>
-          <p:cNvPr id="30" name="Picture 44"/>
-          <p:cNvPicPr>
-            <a:picLocks noChangeAspect="1" noChangeArrowheads="1"/>
-          </p:cNvPicPr>
-          <p:nvPr/>
-        </p:nvPicPr>
-        <p:blipFill>
-          <a:blip r:embed="rId9" cstate="print"/>
-          <a:srcRect/>
-          <a:stretch>
-            <a:fillRect/>
-          </a:stretch>
-        </p:blipFill>
-        <p:spPr bwMode="auto">
-          <a:xfrm>
-            <a:off x="5486401" y="4495800"/>
-            <a:ext cx="746825" cy="920576"/>
-          </a:xfrm>
-          <a:prstGeom prst="rect">
-            <a:avLst/>
-          </a:prstGeom>
-          <a:noFill/>
-          <a:ln w="9525">
-            <a:noFill/>
-            <a:miter lim="800000"/>
-            <a:headEnd/>
-            <a:tailEnd/>
-          </a:ln>
-          <a:effectLst/>
-        </p:spPr>
-      </p:pic>
-      <p:pic>
-        <p:nvPicPr>
-          <p:cNvPr id="31" name="Picture 7"/>
-          <p:cNvPicPr>
-            <a:picLocks noChangeAspect="1" noChangeArrowheads="1"/>
-          </p:cNvPicPr>
-          <p:nvPr/>
-        </p:nvPicPr>
-        <p:blipFill>
-          <a:blip r:embed="rId10" cstate="print"/>
-          <a:srcRect/>
-          <a:stretch>
-            <a:fillRect/>
-          </a:stretch>
-        </p:blipFill>
-        <p:spPr bwMode="auto">
-          <a:xfrm>
-            <a:off x="3810001" y="4001896"/>
-            <a:ext cx="931245" cy="858086"/>
-          </a:xfrm>
-          <a:prstGeom prst="rect">
-            <a:avLst/>
-          </a:prstGeom>
-          <a:noFill/>
-          <a:ln w="9525">
-            <a:noFill/>
-            <a:miter lim="800000"/>
-            <a:headEnd/>
-            <a:tailEnd/>
-          </a:ln>
-          <a:effectLst/>
-        </p:spPr>
-      </p:pic>
-      <p:pic>
-        <p:nvPicPr>
-          <p:cNvPr id="32" name="Picture 8"/>
-          <p:cNvPicPr>
-            <a:picLocks noChangeAspect="1" noChangeArrowheads="1"/>
-          </p:cNvPicPr>
-          <p:nvPr/>
-        </p:nvPicPr>
-        <p:blipFill>
-          <a:blip r:embed="rId11" cstate="print"/>
-          <a:srcRect/>
-          <a:stretch>
-            <a:fillRect/>
-          </a:stretch>
-        </p:blipFill>
-        <p:spPr bwMode="auto">
-          <a:xfrm>
-            <a:off x="8382001" y="4038601"/>
-            <a:ext cx="955631" cy="842845"/>
-          </a:xfrm>
-          <a:prstGeom prst="rect">
-            <a:avLst/>
-          </a:prstGeom>
-          <a:noFill/>
-          <a:ln w="9525">
-            <a:noFill/>
-            <a:miter lim="800000"/>
-            <a:headEnd/>
-            <a:tailEnd/>
-          </a:ln>
-          <a:effectLst/>
-        </p:spPr>
-      </p:pic>
-      <p:pic>
-        <p:nvPicPr>
-          <p:cNvPr id="33" name="Picture 6"/>
-          <p:cNvPicPr>
-            <a:picLocks noChangeAspect="1" noChangeArrowheads="1"/>
-          </p:cNvPicPr>
-          <p:nvPr/>
-        </p:nvPicPr>
-        <p:blipFill>
-          <a:blip r:embed="rId12" cstate="print"/>
-          <a:srcRect/>
-          <a:stretch>
-            <a:fillRect/>
-          </a:stretch>
-        </p:blipFill>
-        <p:spPr bwMode="auto">
-          <a:xfrm>
-            <a:off x="4267201" y="5410200"/>
-            <a:ext cx="789501" cy="603556"/>
-          </a:xfrm>
-          <a:prstGeom prst="rect">
-            <a:avLst/>
-          </a:prstGeom>
-          <a:noFill/>
-          <a:ln w="9525">
-            <a:noFill/>
-            <a:miter lim="800000"/>
-            <a:headEnd/>
-            <a:tailEnd/>
-          </a:ln>
-          <a:effectLst/>
-        </p:spPr>
-      </p:pic>
-      <p:pic>
-        <p:nvPicPr>
-          <p:cNvPr id="34" name="Picture 8"/>
-          <p:cNvPicPr>
-            <a:picLocks noChangeAspect="1" noChangeArrowheads="1"/>
-          </p:cNvPicPr>
-          <p:nvPr/>
-        </p:nvPicPr>
-        <p:blipFill>
-          <a:blip r:embed="rId13" cstate="print"/>
-          <a:srcRect/>
-          <a:stretch>
-            <a:fillRect/>
-          </a:stretch>
-        </p:blipFill>
-        <p:spPr bwMode="auto">
-          <a:xfrm>
-            <a:off x="6629400" y="3886200"/>
-            <a:ext cx="784928" cy="880948"/>
-          </a:xfrm>
-          <a:prstGeom prst="rect">
-            <a:avLst/>
-          </a:prstGeom>
-          <a:noFill/>
-          <a:ln w="9525">
-            <a:noFill/>
-            <a:miter lim="800000"/>
-            <a:headEnd/>
-            <a:tailEnd/>
-          </a:ln>
-          <a:effectLst/>
-        </p:spPr>
-      </p:pic>
-      <p:pic>
-        <p:nvPicPr>
-          <p:cNvPr id="37" name="Picture 6"/>
-          <p:cNvPicPr>
-            <a:picLocks noChangeAspect="1" noChangeArrowheads="1"/>
-          </p:cNvPicPr>
-          <p:nvPr/>
-        </p:nvPicPr>
-        <p:blipFill>
-          <a:blip r:embed="rId14" cstate="print"/>
-          <a:srcRect/>
-          <a:stretch>
-            <a:fillRect/>
-          </a:stretch>
-        </p:blipFill>
-        <p:spPr bwMode="auto">
-          <a:xfrm>
-            <a:off x="5410201" y="2749245"/>
-            <a:ext cx="678239" cy="862659"/>
-          </a:xfrm>
-          <a:prstGeom prst="rect">
-            <a:avLst/>
-          </a:prstGeom>
-          <a:noFill/>
-          <a:ln w="9525">
-            <a:noFill/>
-            <a:miter lim="800000"/>
-            <a:headEnd/>
-            <a:tailEnd/>
-          </a:ln>
-          <a:effectLst/>
-        </p:spPr>
-      </p:pic>
-      <p:pic>
-        <p:nvPicPr>
-          <p:cNvPr id="38" name="Picture 6"/>
-          <p:cNvPicPr>
-            <a:picLocks noChangeAspect="1" noChangeArrowheads="1"/>
-          </p:cNvPicPr>
-          <p:nvPr/>
-        </p:nvPicPr>
-        <p:blipFill>
-          <a:blip r:embed="rId15" cstate="print"/>
-          <a:srcRect/>
-          <a:stretch>
-            <a:fillRect/>
-          </a:stretch>
-        </p:blipFill>
-        <p:spPr bwMode="auto">
-          <a:xfrm>
-            <a:off x="7467600" y="2706497"/>
-            <a:ext cx="850466" cy="777307"/>
-          </a:xfrm>
-          <a:prstGeom prst="rect">
-            <a:avLst/>
-          </a:prstGeom>
-          <a:noFill/>
-          <a:ln w="9525">
-            <a:noFill/>
-            <a:miter lim="800000"/>
-            <a:headEnd/>
-            <a:tailEnd/>
-          </a:ln>
-          <a:effectLst/>
-        </p:spPr>
-      </p:pic>
-      <p:pic>
-        <p:nvPicPr>
-          <p:cNvPr id="39" name="Picture 31"/>
-          <p:cNvPicPr>
-            <a:picLocks noChangeAspect="1" noChangeArrowheads="1"/>
-          </p:cNvPicPr>
-          <p:nvPr/>
-        </p:nvPicPr>
-        <p:blipFill>
-          <a:blip r:embed="rId16" cstate="print"/>
-          <a:srcRect/>
-          <a:stretch>
-            <a:fillRect/>
-          </a:stretch>
-        </p:blipFill>
-        <p:spPr bwMode="auto">
-          <a:xfrm>
-            <a:off x="7848601" y="5029201"/>
-            <a:ext cx="563929" cy="951059"/>
-          </a:xfrm>
-          <a:prstGeom prst="rect">
-            <a:avLst/>
-          </a:prstGeom>
-          <a:noFill/>
-          <a:ln w="9525">
-            <a:noFill/>
-            <a:miter lim="800000"/>
-            <a:headEnd/>
-            <a:tailEnd/>
-          </a:ln>
-          <a:effectLst/>
-        </p:spPr>
-      </p:pic>
-    </p:spTree>
   </p:cSld>
   <p:clrMapOvr>
     <a:masterClrMapping/>

</xml_diff>